<commit_message>
Revised rough draft ready for communication with Hans Hasse.
</commit_message>
<xml_diff>
--- a/FlowChart.pptx
+++ b/FlowChart.pptx
@@ -104,7 +104,16 @@
       </a:defRPr>
     </a:lvl9pPr>
   </p:defaultTextStyle>
+  <p:extLst>
+    <p:ext uri="{EFAFB233-063F-42B5-8137-9DF3F51BA10A}">
+      <p15:sldGuideLst xmlns:p15="http://schemas.microsoft.com/office/powerpoint/2012/main"/>
+    </p:ext>
+  </p:extLst>
 </p:presentation>
+</file>
+
+<file path=ppt/revisionInfo.xml><?xml version="1.0" encoding="utf-8"?>
+<p1510:revInfo xmlns:a="http://schemas.openxmlformats.org/drawingml/2006/main" xmlns:r="http://schemas.openxmlformats.org/officeDocument/2006/relationships" xmlns:p1510="http://schemas.microsoft.com/office/powerpoint/2015/10/main"/>
 </file>
 
 <file path=ppt/slideLayouts/slideLayout1.xml><?xml version="1.0" encoding="utf-8"?>
@@ -2970,10 +2979,10 @@
       </p:grpSpPr>
       <p:grpSp>
         <p:nvGrpSpPr>
-          <p:cNvPr id="36" name="Group 35">
+          <p:cNvPr id="17" name="Group 16">
             <a:extLst>
               <a:ext uri="{FF2B5EF4-FFF2-40B4-BE49-F238E27FC236}">
-                <a16:creationId xmlns:a16="http://schemas.microsoft.com/office/drawing/2014/main" id="{36D4B118-8C95-42E0-AE7F-239D9A5F9AE2}"/>
+                <a16:creationId xmlns:a16="http://schemas.microsoft.com/office/drawing/2014/main" id="{7AF242CD-DBDF-4142-A53C-E7104BA8D3B4}"/>
               </a:ext>
             </a:extLst>
           </p:cNvPr>
@@ -2983,897 +2992,921 @@
         <p:grpSpPr>
           <a:xfrm>
             <a:off x="175742" y="351676"/>
-            <a:ext cx="11011104" cy="6734925"/>
-            <a:chOff x="1817816" y="1368825"/>
-            <a:chExt cx="8227996" cy="5032641"/>
+            <a:ext cx="11295249" cy="6734925"/>
+            <a:chOff x="175742" y="351676"/>
+            <a:chExt cx="11295249" cy="6734925"/>
           </a:xfrm>
         </p:grpSpPr>
-        <p:sp>
-          <p:nvSpPr>
-            <p:cNvPr id="4" name="Oval 3">
+        <p:grpSp>
+          <p:nvGrpSpPr>
+            <p:cNvPr id="36" name="Group 35">
               <a:extLst>
                 <a:ext uri="{FF2B5EF4-FFF2-40B4-BE49-F238E27FC236}">
-                  <a16:creationId xmlns:a16="http://schemas.microsoft.com/office/drawing/2014/main" id="{8B5838BC-CC7D-4118-8C10-E74691CE73D8}"/>
+                  <a16:creationId xmlns:a16="http://schemas.microsoft.com/office/drawing/2014/main" id="{36D4B118-8C95-42E0-AE7F-239D9A5F9AE2}"/>
                 </a:ext>
               </a:extLst>
             </p:cNvPr>
-            <p:cNvSpPr/>
+            <p:cNvGrpSpPr/>
             <p:nvPr/>
-          </p:nvSpPr>
-          <p:spPr>
+          </p:nvGrpSpPr>
+          <p:grpSpPr>
             <a:xfrm>
-              <a:off x="1817816" y="1368825"/>
-              <a:ext cx="1554480" cy="1554480"/>
+              <a:off x="175742" y="351676"/>
+              <a:ext cx="11180793" cy="6734925"/>
+              <a:chOff x="1817816" y="1368825"/>
+              <a:chExt cx="8354791" cy="5032641"/>
             </a:xfrm>
-            <a:prstGeom prst="ellipse">
-              <a:avLst/>
-            </a:prstGeom>
-            <a:solidFill>
-              <a:schemeClr val="bg1"/>
-            </a:solidFill>
-            <a:ln w="38100">
+          </p:grpSpPr>
+          <p:sp>
+            <p:nvSpPr>
+              <p:cNvPr id="4" name="Oval 3">
+                <a:extLst>
+                  <a:ext uri="{FF2B5EF4-FFF2-40B4-BE49-F238E27FC236}">
+                    <a16:creationId xmlns:a16="http://schemas.microsoft.com/office/drawing/2014/main" id="{8B5838BC-CC7D-4118-8C10-E74691CE73D8}"/>
+                  </a:ext>
+                </a:extLst>
+              </p:cNvPr>
+              <p:cNvSpPr/>
+              <p:nvPr/>
+            </p:nvSpPr>
+            <p:spPr>
+              <a:xfrm>
+                <a:off x="1817816" y="1368825"/>
+                <a:ext cx="1554480" cy="1554480"/>
+              </a:xfrm>
+              <a:prstGeom prst="ellipse">
+                <a:avLst/>
+              </a:prstGeom>
               <a:solidFill>
-                <a:srgbClr val="FF0000"/>
+                <a:schemeClr val="bg1"/>
               </a:solidFill>
-            </a:ln>
-          </p:spPr>
-          <p:style>
-            <a:lnRef idx="2">
-              <a:schemeClr val="accent1">
-                <a:shade val="50000"/>
-              </a:schemeClr>
-            </a:lnRef>
-            <a:fillRef idx="1">
-              <a:schemeClr val="accent1"/>
-            </a:fillRef>
-            <a:effectRef idx="0">
-              <a:schemeClr val="accent1"/>
-            </a:effectRef>
-            <a:fontRef idx="minor">
-              <a:schemeClr val="lt1"/>
-            </a:fontRef>
-          </p:style>
-          <p:txBody>
-            <a:bodyPr rot="0" spcFirstLastPara="0" vertOverflow="overflow" horzOverflow="overflow" vert="horz" wrap="square" lIns="0" tIns="0" rIns="0" bIns="0" numCol="1" spcCol="0" rtlCol="0" fromWordArt="0" anchor="ctr" anchorCtr="0" forceAA="0" compatLnSpc="1">
-              <a:prstTxWarp prst="textNoShape">
+              <a:ln w="38100">
+                <a:solidFill>
+                  <a:srgbClr val="FF0000"/>
+                </a:solidFill>
+              </a:ln>
+            </p:spPr>
+            <p:style>
+              <a:lnRef idx="2">
+                <a:schemeClr val="accent1">
+                  <a:shade val="50000"/>
+                </a:schemeClr>
+              </a:lnRef>
+              <a:fillRef idx="1">
+                <a:schemeClr val="accent1"/>
+              </a:fillRef>
+              <a:effectRef idx="0">
+                <a:schemeClr val="accent1"/>
+              </a:effectRef>
+              <a:fontRef idx="minor">
+                <a:schemeClr val="lt1"/>
+              </a:fontRef>
+            </p:style>
+            <p:txBody>
+              <a:bodyPr rot="0" spcFirstLastPara="0" vertOverflow="overflow" horzOverflow="overflow" vert="horz" wrap="square" lIns="0" tIns="0" rIns="0" bIns="0" numCol="1" spcCol="0" rtlCol="0" fromWordArt="0" anchor="ctr" anchorCtr="0" forceAA="0" compatLnSpc="1">
+                <a:prstTxWarp prst="textNoShape">
+                  <a:avLst/>
+                </a:prstTxWarp>
+                <a:noAutofit/>
+              </a:bodyPr>
+              <a:lstStyle/>
+              <a:p>
+                <a:pPr algn="ctr"/>
+                <a:r>
+                  <a:rPr lang="en-US" sz="4281" dirty="0">
+                    <a:solidFill>
+                      <a:sysClr val="windowText" lastClr="000000"/>
+                    </a:solidFill>
+                    <a:latin typeface="Times New Roman" panose="02020603050405020304" pitchFamily="18" charset="0"/>
+                    <a:cs typeface="Times New Roman" panose="02020603050405020304" pitchFamily="18" charset="0"/>
+                  </a:rPr>
+                  <a:t>Exp. Data</a:t>
+                </a:r>
+              </a:p>
+            </p:txBody>
+          </p:sp>
+          <p:sp>
+            <p:nvSpPr>
+              <p:cNvPr id="5" name="Oval 4">
+                <a:extLst>
+                  <a:ext uri="{FF2B5EF4-FFF2-40B4-BE49-F238E27FC236}">
+                    <a16:creationId xmlns:a16="http://schemas.microsoft.com/office/drawing/2014/main" id="{FBA4C809-2143-4ECC-B707-399C574F8D12}"/>
+                  </a:ext>
+                </a:extLst>
+              </p:cNvPr>
+              <p:cNvSpPr/>
+              <p:nvPr/>
+            </p:nvSpPr>
+            <p:spPr>
+              <a:xfrm>
+                <a:off x="3448216" y="1368825"/>
+                <a:ext cx="1554480" cy="1554480"/>
+              </a:xfrm>
+              <a:prstGeom prst="ellipse">
                 <a:avLst/>
-              </a:prstTxWarp>
-              <a:noAutofit/>
-            </a:bodyPr>
-            <a:lstStyle/>
-            <a:p>
-              <a:pPr algn="ctr"/>
-              <a:r>
-                <a:rPr lang="en-US" sz="4281" dirty="0">
-                  <a:solidFill>
-                    <a:sysClr val="windowText" lastClr="000000"/>
-                  </a:solidFill>
-                  <a:latin typeface="Times New Roman" panose="02020603050405020304" pitchFamily="18" charset="0"/>
-                  <a:cs typeface="Times New Roman" panose="02020603050405020304" pitchFamily="18" charset="0"/>
-                </a:rPr>
-                <a:t>Exp. Data</a:t>
-              </a:r>
-            </a:p>
-          </p:txBody>
-        </p:sp>
-        <p:sp>
-          <p:nvSpPr>
-            <p:cNvPr id="5" name="Oval 4">
-              <a:extLst>
-                <a:ext uri="{FF2B5EF4-FFF2-40B4-BE49-F238E27FC236}">
-                  <a16:creationId xmlns:a16="http://schemas.microsoft.com/office/drawing/2014/main" id="{FBA4C809-2143-4ECC-B707-399C574F8D12}"/>
-                </a:ext>
-              </a:extLst>
-            </p:cNvPr>
-            <p:cNvSpPr/>
-            <p:nvPr/>
-          </p:nvSpPr>
-          <p:spPr>
-            <a:xfrm>
-              <a:off x="3448216" y="1368825"/>
-              <a:ext cx="1554480" cy="1554480"/>
-            </a:xfrm>
-            <a:prstGeom prst="ellipse">
-              <a:avLst/>
-            </a:prstGeom>
-            <a:solidFill>
-              <a:schemeClr val="bg1"/>
-            </a:solidFill>
-            <a:ln w="38100">
+              </a:prstGeom>
               <a:solidFill>
-                <a:srgbClr val="FF0000"/>
+                <a:schemeClr val="bg1"/>
               </a:solidFill>
-            </a:ln>
-          </p:spPr>
-          <p:style>
-            <a:lnRef idx="2">
-              <a:schemeClr val="accent1">
-                <a:shade val="50000"/>
-              </a:schemeClr>
-            </a:lnRef>
-            <a:fillRef idx="1">
-              <a:schemeClr val="accent1"/>
-            </a:fillRef>
-            <a:effectRef idx="0">
-              <a:schemeClr val="accent1"/>
-            </a:effectRef>
-            <a:fontRef idx="minor">
-              <a:schemeClr val="lt1"/>
-            </a:fontRef>
-          </p:style>
-          <p:txBody>
-            <a:bodyPr rot="0" spcFirstLastPara="0" vertOverflow="overflow" horzOverflow="overflow" vert="horz" wrap="square" lIns="0" tIns="0" rIns="0" bIns="0" numCol="1" spcCol="0" rtlCol="0" fromWordArt="0" anchor="ctr" anchorCtr="0" forceAA="0" compatLnSpc="1">
-              <a:prstTxWarp prst="textNoShape">
+              <a:ln w="38100">
+                <a:solidFill>
+                  <a:srgbClr val="FF0000"/>
+                </a:solidFill>
+              </a:ln>
+            </p:spPr>
+            <p:style>
+              <a:lnRef idx="2">
+                <a:schemeClr val="accent1">
+                  <a:shade val="50000"/>
+                </a:schemeClr>
+              </a:lnRef>
+              <a:fillRef idx="1">
+                <a:schemeClr val="accent1"/>
+              </a:fillRef>
+              <a:effectRef idx="0">
+                <a:schemeClr val="accent1"/>
+              </a:effectRef>
+              <a:fontRef idx="minor">
+                <a:schemeClr val="lt1"/>
+              </a:fontRef>
+            </p:style>
+            <p:txBody>
+              <a:bodyPr rot="0" spcFirstLastPara="0" vertOverflow="overflow" horzOverflow="overflow" vert="horz" wrap="square" lIns="0" tIns="0" rIns="0" bIns="0" numCol="1" spcCol="0" rtlCol="0" fromWordArt="0" anchor="ctr" anchorCtr="0" forceAA="0" compatLnSpc="1">
+                <a:prstTxWarp prst="textNoShape">
+                  <a:avLst/>
+                </a:prstTxWarp>
+                <a:noAutofit/>
+              </a:bodyPr>
+              <a:lstStyle/>
+              <a:p>
+                <a:pPr algn="ctr"/>
+                <a:r>
+                  <a:rPr lang="en-US" sz="4281" i="1" dirty="0">
+                    <a:solidFill>
+                      <a:sysClr val="windowText" lastClr="000000"/>
+                    </a:solidFill>
+                    <a:latin typeface="Times New Roman" panose="02020603050405020304" pitchFamily="18" charset="0"/>
+                    <a:cs typeface="Times New Roman" panose="02020603050405020304" pitchFamily="18" charset="0"/>
+                  </a:rPr>
+                  <a:t>ms2</a:t>
+                </a:r>
+              </a:p>
+            </p:txBody>
+          </p:sp>
+          <p:sp>
+            <p:nvSpPr>
+              <p:cNvPr id="6" name="Oval 5">
+                <a:extLst>
+                  <a:ext uri="{FF2B5EF4-FFF2-40B4-BE49-F238E27FC236}">
+                    <a16:creationId xmlns:a16="http://schemas.microsoft.com/office/drawing/2014/main" id="{31472ADB-0B30-48C3-8EAF-530CC56EE035}"/>
+                  </a:ext>
+                </a:extLst>
+              </p:cNvPr>
+              <p:cNvSpPr/>
+              <p:nvPr/>
+            </p:nvSpPr>
+            <p:spPr>
+              <a:xfrm>
+                <a:off x="2610462" y="4846986"/>
+                <a:ext cx="1554480" cy="1554480"/>
+              </a:xfrm>
+              <a:prstGeom prst="ellipse">
                 <a:avLst/>
-              </a:prstTxWarp>
-              <a:noAutofit/>
-            </a:bodyPr>
-            <a:lstStyle/>
-            <a:p>
-              <a:pPr algn="ctr"/>
-              <a:r>
-                <a:rPr lang="en-US" sz="4281" i="1" dirty="0">
-                  <a:solidFill>
-                    <a:sysClr val="windowText" lastClr="000000"/>
-                  </a:solidFill>
-                  <a:latin typeface="Times New Roman" panose="02020603050405020304" pitchFamily="18" charset="0"/>
-                  <a:cs typeface="Times New Roman" panose="02020603050405020304" pitchFamily="18" charset="0"/>
-                </a:rPr>
-                <a:t>ms2</a:t>
-              </a:r>
-            </a:p>
-          </p:txBody>
-        </p:sp>
-        <p:sp>
-          <p:nvSpPr>
-            <p:cNvPr id="6" name="Oval 5">
-              <a:extLst>
-                <a:ext uri="{FF2B5EF4-FFF2-40B4-BE49-F238E27FC236}">
-                  <a16:creationId xmlns:a16="http://schemas.microsoft.com/office/drawing/2014/main" id="{31472ADB-0B30-48C3-8EAF-530CC56EE035}"/>
-                </a:ext>
-              </a:extLst>
-            </p:cNvPr>
-            <p:cNvSpPr/>
-            <p:nvPr/>
-          </p:nvSpPr>
-          <p:spPr>
-            <a:xfrm>
-              <a:off x="2610462" y="4846986"/>
-              <a:ext cx="1554480" cy="1554480"/>
-            </a:xfrm>
-            <a:prstGeom prst="ellipse">
-              <a:avLst/>
-            </a:prstGeom>
-            <a:solidFill>
-              <a:schemeClr val="bg1"/>
-            </a:solidFill>
-            <a:ln w="38100">
+              </a:prstGeom>
               <a:solidFill>
-                <a:srgbClr val="FF0000"/>
+                <a:schemeClr val="bg1"/>
               </a:solidFill>
-            </a:ln>
-          </p:spPr>
-          <p:style>
-            <a:lnRef idx="2">
-              <a:schemeClr val="accent1">
-                <a:shade val="50000"/>
-              </a:schemeClr>
-            </a:lnRef>
-            <a:fillRef idx="1">
-              <a:schemeClr val="accent1"/>
-            </a:fillRef>
-            <a:effectRef idx="0">
-              <a:schemeClr val="accent1"/>
-            </a:effectRef>
-            <a:fontRef idx="minor">
-              <a:schemeClr val="lt1"/>
-            </a:fontRef>
-          </p:style>
-          <p:txBody>
-            <a:bodyPr rot="0" spcFirstLastPara="0" vertOverflow="overflow" horzOverflow="overflow" vert="horz" wrap="square" lIns="0" tIns="0" rIns="0" bIns="0" numCol="1" spcCol="0" rtlCol="0" fromWordArt="0" anchor="ctr" anchorCtr="0" forceAA="0" compatLnSpc="1">
-              <a:prstTxWarp prst="textNoShape">
+              <a:ln w="38100">
+                <a:solidFill>
+                  <a:srgbClr val="FF0000"/>
+                </a:solidFill>
+              </a:ln>
+            </p:spPr>
+            <p:style>
+              <a:lnRef idx="2">
+                <a:schemeClr val="accent1">
+                  <a:shade val="50000"/>
+                </a:schemeClr>
+              </a:lnRef>
+              <a:fillRef idx="1">
+                <a:schemeClr val="accent1"/>
+              </a:fillRef>
+              <a:effectRef idx="0">
+                <a:schemeClr val="accent1"/>
+              </a:effectRef>
+              <a:fontRef idx="minor">
+                <a:schemeClr val="lt1"/>
+              </a:fontRef>
+            </p:style>
+            <p:txBody>
+              <a:bodyPr rot="0" spcFirstLastPara="0" vertOverflow="overflow" horzOverflow="overflow" vert="horz" wrap="square" lIns="0" tIns="0" rIns="0" bIns="0" numCol="1" spcCol="0" rtlCol="0" fromWordArt="0" anchor="ctr" anchorCtr="0" forceAA="0" compatLnSpc="1">
+                <a:prstTxWarp prst="textNoShape">
+                  <a:avLst/>
+                </a:prstTxWarp>
+                <a:noAutofit/>
+              </a:bodyPr>
+              <a:lstStyle/>
+              <a:p>
+                <a:pPr algn="ctr"/>
+                <a:r>
+                  <a:rPr lang="en-US" sz="3747" dirty="0">
+                    <a:solidFill>
+                      <a:sysClr val="windowText" lastClr="000000"/>
+                    </a:solidFill>
+                    <a:latin typeface="Times New Roman" panose="02020603050405020304" pitchFamily="18" charset="0"/>
+                    <a:cs typeface="Times New Roman" panose="02020603050405020304" pitchFamily="18" charset="0"/>
+                  </a:rPr>
+                  <a:t>Hybrid Data Set</a:t>
+                </a:r>
+              </a:p>
+            </p:txBody>
+          </p:sp>
+          <p:sp>
+            <p:nvSpPr>
+              <p:cNvPr id="8" name="Oval 7">
+                <a:extLst>
+                  <a:ext uri="{FF2B5EF4-FFF2-40B4-BE49-F238E27FC236}">
+                    <a16:creationId xmlns:a16="http://schemas.microsoft.com/office/drawing/2014/main" id="{D0997302-0ACD-4554-8D5B-B5FA7596932E}"/>
+                  </a:ext>
+                </a:extLst>
+              </p:cNvPr>
+              <p:cNvSpPr/>
+              <p:nvPr/>
+            </p:nvSpPr>
+            <p:spPr>
+              <a:xfrm>
+                <a:off x="6163201" y="4846986"/>
+                <a:ext cx="1554480" cy="1554480"/>
+              </a:xfrm>
+              <a:prstGeom prst="ellipse">
                 <a:avLst/>
-              </a:prstTxWarp>
-              <a:noAutofit/>
-            </a:bodyPr>
-            <a:lstStyle/>
-            <a:p>
-              <a:pPr algn="ctr"/>
-              <a:r>
-                <a:rPr lang="en-US" sz="3747" dirty="0">
-                  <a:solidFill>
-                    <a:sysClr val="windowText" lastClr="000000"/>
-                  </a:solidFill>
-                  <a:latin typeface="Times New Roman" panose="02020603050405020304" pitchFamily="18" charset="0"/>
-                  <a:cs typeface="Times New Roman" panose="02020603050405020304" pitchFamily="18" charset="0"/>
-                </a:rPr>
-                <a:t>Hybrid Data Set</a:t>
-              </a:r>
-            </a:p>
-          </p:txBody>
-        </p:sp>
-        <p:sp>
-          <p:nvSpPr>
-            <p:cNvPr id="8" name="Oval 7">
-              <a:extLst>
-                <a:ext uri="{FF2B5EF4-FFF2-40B4-BE49-F238E27FC236}">
-                  <a16:creationId xmlns:a16="http://schemas.microsoft.com/office/drawing/2014/main" id="{D0997302-0ACD-4554-8D5B-B5FA7596932E}"/>
-                </a:ext>
-              </a:extLst>
-            </p:cNvPr>
-            <p:cNvSpPr/>
-            <p:nvPr/>
-          </p:nvSpPr>
-          <p:spPr>
-            <a:xfrm>
-              <a:off x="5941174" y="4846986"/>
-              <a:ext cx="1554480" cy="1554480"/>
-            </a:xfrm>
-            <a:prstGeom prst="ellipse">
-              <a:avLst/>
-            </a:prstGeom>
-            <a:solidFill>
-              <a:schemeClr val="bg1"/>
-            </a:solidFill>
-            <a:ln w="38100">
+              </a:prstGeom>
               <a:solidFill>
-                <a:srgbClr val="FF0000"/>
+                <a:schemeClr val="bg1"/>
               </a:solidFill>
-            </a:ln>
-          </p:spPr>
-          <p:style>
-            <a:lnRef idx="2">
-              <a:schemeClr val="accent1">
-                <a:shade val="50000"/>
-              </a:schemeClr>
-            </a:lnRef>
-            <a:fillRef idx="1">
-              <a:schemeClr val="accent1"/>
-            </a:fillRef>
-            <a:effectRef idx="0">
-              <a:schemeClr val="accent1"/>
-            </a:effectRef>
-            <a:fontRef idx="minor">
-              <a:schemeClr val="lt1"/>
-            </a:fontRef>
-          </p:style>
-          <p:txBody>
-            <a:bodyPr rot="0" spcFirstLastPara="0" vertOverflow="overflow" horzOverflow="overflow" vert="horz" wrap="square" lIns="0" tIns="0" rIns="0" bIns="0" numCol="1" spcCol="0" rtlCol="0" fromWordArt="0" anchor="ctr" anchorCtr="0" forceAA="0" compatLnSpc="1">
-              <a:prstTxWarp prst="textNoShape">
+              <a:ln w="38100">
+                <a:solidFill>
+                  <a:srgbClr val="FF0000"/>
+                </a:solidFill>
+              </a:ln>
+            </p:spPr>
+            <p:style>
+              <a:lnRef idx="2">
+                <a:schemeClr val="accent1">
+                  <a:shade val="50000"/>
+                </a:schemeClr>
+              </a:lnRef>
+              <a:fillRef idx="1">
+                <a:schemeClr val="accent1"/>
+              </a:fillRef>
+              <a:effectRef idx="0">
+                <a:schemeClr val="accent1"/>
+              </a:effectRef>
+              <a:fontRef idx="minor">
+                <a:schemeClr val="lt1"/>
+              </a:fontRef>
+            </p:style>
+            <p:txBody>
+              <a:bodyPr rot="0" spcFirstLastPara="0" vertOverflow="overflow" horzOverflow="overflow" vert="horz" wrap="square" lIns="0" tIns="0" rIns="0" bIns="0" numCol="1" spcCol="0" rtlCol="0" fromWordArt="0" anchor="ctr" anchorCtr="0" forceAA="0" compatLnSpc="1">
+                <a:prstTxWarp prst="textNoShape">
+                  <a:avLst/>
+                </a:prstTxWarp>
+                <a:noAutofit/>
+              </a:bodyPr>
+              <a:lstStyle/>
+              <a:p>
+                <a:pPr algn="ctr"/>
+                <a:r>
+                  <a:rPr lang="en-US" sz="4281" dirty="0">
+                    <a:solidFill>
+                      <a:sysClr val="windowText" lastClr="000000"/>
+                    </a:solidFill>
+                    <a:latin typeface="Times New Roman" panose="02020603050405020304" pitchFamily="18" charset="0"/>
+                    <a:cs typeface="Times New Roman" panose="02020603050405020304" pitchFamily="18" charset="0"/>
+                  </a:rPr>
+                  <a:t>FEOS</a:t>
+                </a:r>
+              </a:p>
+            </p:txBody>
+          </p:sp>
+          <p:sp>
+            <p:nvSpPr>
+              <p:cNvPr id="9" name="Oval 8">
+                <a:extLst>
+                  <a:ext uri="{FF2B5EF4-FFF2-40B4-BE49-F238E27FC236}">
+                    <a16:creationId xmlns:a16="http://schemas.microsoft.com/office/drawing/2014/main" id="{3CC4AF83-21E0-4969-AE98-FA6B0D0E0489}"/>
+                  </a:ext>
+                </a:extLst>
+              </p:cNvPr>
+              <p:cNvSpPr/>
+              <p:nvPr/>
+            </p:nvSpPr>
+            <p:spPr>
+              <a:xfrm>
+                <a:off x="6174152" y="2435787"/>
+                <a:ext cx="1554480" cy="1554480"/>
+              </a:xfrm>
+              <a:prstGeom prst="ellipse">
                 <a:avLst/>
-              </a:prstTxWarp>
-              <a:noAutofit/>
-            </a:bodyPr>
-            <a:lstStyle/>
-            <a:p>
-              <a:pPr algn="ctr"/>
-              <a:r>
-                <a:rPr lang="en-US" sz="4281" dirty="0">
-                  <a:solidFill>
-                    <a:sysClr val="windowText" lastClr="000000"/>
-                  </a:solidFill>
-                  <a:latin typeface="Times New Roman" panose="02020603050405020304" pitchFamily="18" charset="0"/>
-                  <a:cs typeface="Times New Roman" panose="02020603050405020304" pitchFamily="18" charset="0"/>
-                </a:rPr>
-                <a:t>FEOS</a:t>
-              </a:r>
-            </a:p>
-          </p:txBody>
-        </p:sp>
-        <p:sp>
-          <p:nvSpPr>
-            <p:cNvPr id="9" name="Oval 8">
-              <a:extLst>
-                <a:ext uri="{FF2B5EF4-FFF2-40B4-BE49-F238E27FC236}">
-                  <a16:creationId xmlns:a16="http://schemas.microsoft.com/office/drawing/2014/main" id="{3CC4AF83-21E0-4969-AE98-FA6B0D0E0489}"/>
-                </a:ext>
-              </a:extLst>
-            </p:cNvPr>
-            <p:cNvSpPr/>
-            <p:nvPr/>
-          </p:nvSpPr>
-          <p:spPr>
-            <a:xfrm>
-              <a:off x="5941174" y="2442221"/>
-              <a:ext cx="1554480" cy="1554480"/>
-            </a:xfrm>
-            <a:prstGeom prst="ellipse">
-              <a:avLst/>
-            </a:prstGeom>
-            <a:solidFill>
-              <a:schemeClr val="bg1"/>
-            </a:solidFill>
-            <a:ln w="38100">
+              </a:prstGeom>
               <a:solidFill>
-                <a:srgbClr val="FF0000"/>
+                <a:schemeClr val="bg1"/>
               </a:solidFill>
-            </a:ln>
-          </p:spPr>
-          <p:style>
-            <a:lnRef idx="2">
-              <a:schemeClr val="accent1">
-                <a:shade val="50000"/>
-              </a:schemeClr>
-            </a:lnRef>
-            <a:fillRef idx="1">
-              <a:schemeClr val="accent1"/>
-            </a:fillRef>
-            <a:effectRef idx="0">
-              <a:schemeClr val="accent1"/>
-            </a:effectRef>
-            <a:fontRef idx="minor">
-              <a:schemeClr val="lt1"/>
-            </a:fontRef>
-          </p:style>
-          <p:txBody>
-            <a:bodyPr rot="0" spcFirstLastPara="0" vertOverflow="overflow" horzOverflow="overflow" vert="horz" wrap="square" lIns="0" tIns="0" rIns="0" bIns="0" numCol="1" spcCol="0" rtlCol="0" fromWordArt="0" anchor="ctr" anchorCtr="0" forceAA="0" compatLnSpc="1">
-              <a:prstTxWarp prst="textNoShape">
+              <a:ln w="38100">
+                <a:solidFill>
+                  <a:srgbClr val="FF0000"/>
+                </a:solidFill>
+              </a:ln>
+            </p:spPr>
+            <p:style>
+              <a:lnRef idx="2">
+                <a:schemeClr val="accent1">
+                  <a:shade val="50000"/>
+                </a:schemeClr>
+              </a:lnRef>
+              <a:fillRef idx="1">
+                <a:schemeClr val="accent1"/>
+              </a:fillRef>
+              <a:effectRef idx="0">
+                <a:schemeClr val="accent1"/>
+              </a:effectRef>
+              <a:fontRef idx="minor">
+                <a:schemeClr val="lt1"/>
+              </a:fontRef>
+            </p:style>
+            <p:txBody>
+              <a:bodyPr rot="0" spcFirstLastPara="0" vertOverflow="overflow" horzOverflow="overflow" vert="horz" wrap="square" lIns="0" tIns="0" rIns="0" bIns="0" numCol="1" spcCol="0" rtlCol="0" fromWordArt="0" anchor="ctr" anchorCtr="0" forceAA="0" compatLnSpc="1">
+                <a:prstTxWarp prst="textNoShape">
+                  <a:avLst/>
+                </a:prstTxWarp>
+                <a:noAutofit/>
+              </a:bodyPr>
+              <a:lstStyle/>
+              <a:p>
+                <a:pPr algn="ctr"/>
+                <a:r>
+                  <a:rPr lang="en-US" sz="4281" dirty="0">
+                    <a:solidFill>
+                      <a:sysClr val="windowText" lastClr="000000"/>
+                    </a:solidFill>
+                    <a:latin typeface="Times New Roman" panose="02020603050405020304" pitchFamily="18" charset="0"/>
+                    <a:cs typeface="Times New Roman" panose="02020603050405020304" pitchFamily="18" charset="0"/>
+                  </a:rPr>
+                  <a:t>ex-LJ</a:t>
+                </a:r>
+              </a:p>
+            </p:txBody>
+          </p:sp>
+          <p:cxnSp>
+            <p:nvCxnSpPr>
+              <p:cNvPr id="13" name="Straight Arrow Connector 12">
+                <a:extLst>
+                  <a:ext uri="{FF2B5EF4-FFF2-40B4-BE49-F238E27FC236}">
+                    <a16:creationId xmlns:a16="http://schemas.microsoft.com/office/drawing/2014/main" id="{0EAD0A5C-26C6-4127-9E8E-053211AB8CC2}"/>
+                  </a:ext>
+                </a:extLst>
+              </p:cNvPr>
+              <p:cNvCxnSpPr>
+                <a:cxnSpLocks/>
+                <a:stCxn id="4" idx="4"/>
+                <a:endCxn id="6" idx="0"/>
+              </p:cNvCxnSpPr>
+              <p:nvPr/>
+            </p:nvCxnSpPr>
+            <p:spPr>
+              <a:xfrm>
+                <a:off x="2595056" y="2923305"/>
+                <a:ext cx="792646" cy="1923681"/>
+              </a:xfrm>
+              <a:prstGeom prst="straightConnector1">
                 <a:avLst/>
-              </a:prstTxWarp>
-              <a:noAutofit/>
-            </a:bodyPr>
-            <a:lstStyle/>
-            <a:p>
-              <a:pPr algn="ctr"/>
-              <a:r>
-                <a:rPr lang="en-US" sz="4281" dirty="0">
-                  <a:solidFill>
-                    <a:sysClr val="windowText" lastClr="000000"/>
-                  </a:solidFill>
-                  <a:latin typeface="Times New Roman" panose="02020603050405020304" pitchFamily="18" charset="0"/>
-                  <a:cs typeface="Times New Roman" panose="02020603050405020304" pitchFamily="18" charset="0"/>
-                </a:rPr>
-                <a:t>ex-LJ</a:t>
-              </a:r>
-            </a:p>
-          </p:txBody>
-        </p:sp>
-        <p:cxnSp>
-          <p:nvCxnSpPr>
-            <p:cNvPr id="13" name="Straight Arrow Connector 12">
-              <a:extLst>
-                <a:ext uri="{FF2B5EF4-FFF2-40B4-BE49-F238E27FC236}">
-                  <a16:creationId xmlns:a16="http://schemas.microsoft.com/office/drawing/2014/main" id="{0EAD0A5C-26C6-4127-9E8E-053211AB8CC2}"/>
-                </a:ext>
-              </a:extLst>
-            </p:cNvPr>
-            <p:cNvCxnSpPr>
-              <a:cxnSpLocks/>
-              <a:stCxn id="4" idx="4"/>
-              <a:endCxn id="6" idx="0"/>
-            </p:cNvCxnSpPr>
-            <p:nvPr/>
-          </p:nvCxnSpPr>
-          <p:spPr>
-            <a:xfrm>
-              <a:off x="2595056" y="2923305"/>
-              <a:ext cx="792646" cy="1923681"/>
-            </a:xfrm>
-            <a:prstGeom prst="straightConnector1">
-              <a:avLst/>
-            </a:prstGeom>
-            <a:ln w="38100">
-              <a:tailEnd type="triangle"/>
-            </a:ln>
-          </p:spPr>
-          <p:style>
-            <a:lnRef idx="1">
-              <a:schemeClr val="dk1"/>
-            </a:lnRef>
-            <a:fillRef idx="0">
-              <a:schemeClr val="dk1"/>
-            </a:fillRef>
-            <a:effectRef idx="0">
-              <a:schemeClr val="dk1"/>
-            </a:effectRef>
-            <a:fontRef idx="minor">
-              <a:schemeClr val="tx1"/>
-            </a:fontRef>
-          </p:style>
-        </p:cxnSp>
-        <p:cxnSp>
-          <p:nvCxnSpPr>
-            <p:cNvPr id="15" name="Straight Arrow Connector 14">
-              <a:extLst>
-                <a:ext uri="{FF2B5EF4-FFF2-40B4-BE49-F238E27FC236}">
-                  <a16:creationId xmlns:a16="http://schemas.microsoft.com/office/drawing/2014/main" id="{D73F65A3-33FB-45A2-82E3-7925770DA803}"/>
-                </a:ext>
-              </a:extLst>
-            </p:cNvPr>
-            <p:cNvCxnSpPr>
-              <a:cxnSpLocks/>
-              <a:stCxn id="5" idx="4"/>
-              <a:endCxn id="6" idx="0"/>
-            </p:cNvCxnSpPr>
-            <p:nvPr/>
-          </p:nvCxnSpPr>
-          <p:spPr>
-            <a:xfrm flipH="1">
-              <a:off x="3387702" y="2923305"/>
-              <a:ext cx="837754" cy="1923681"/>
-            </a:xfrm>
-            <a:prstGeom prst="straightConnector1">
-              <a:avLst/>
-            </a:prstGeom>
-            <a:ln w="38100">
-              <a:tailEnd type="triangle"/>
-            </a:ln>
-          </p:spPr>
-          <p:style>
-            <a:lnRef idx="1">
-              <a:schemeClr val="dk1"/>
-            </a:lnRef>
-            <a:fillRef idx="0">
-              <a:schemeClr val="dk1"/>
-            </a:fillRef>
-            <a:effectRef idx="0">
-              <a:schemeClr val="dk1"/>
-            </a:effectRef>
-            <a:fontRef idx="minor">
-              <a:schemeClr val="tx1"/>
-            </a:fontRef>
-          </p:style>
-        </p:cxnSp>
-        <p:cxnSp>
-          <p:nvCxnSpPr>
-            <p:cNvPr id="19" name="Straight Arrow Connector 18">
-              <a:extLst>
-                <a:ext uri="{FF2B5EF4-FFF2-40B4-BE49-F238E27FC236}">
-                  <a16:creationId xmlns:a16="http://schemas.microsoft.com/office/drawing/2014/main" id="{A5C39A91-A887-40A1-9F49-9383F61E4B91}"/>
-                </a:ext>
-              </a:extLst>
-            </p:cNvPr>
-            <p:cNvCxnSpPr>
-              <a:cxnSpLocks/>
-              <a:stCxn id="6" idx="6"/>
-              <a:endCxn id="8" idx="2"/>
-            </p:cNvCxnSpPr>
-            <p:nvPr/>
-          </p:nvCxnSpPr>
-          <p:spPr>
-            <a:xfrm>
-              <a:off x="4164942" y="5624226"/>
-              <a:ext cx="1776232" cy="0"/>
-            </a:xfrm>
-            <a:prstGeom prst="straightConnector1">
-              <a:avLst/>
-            </a:prstGeom>
-            <a:ln w="38100">
-              <a:tailEnd type="triangle"/>
-            </a:ln>
-          </p:spPr>
-          <p:style>
-            <a:lnRef idx="1">
-              <a:schemeClr val="dk1"/>
-            </a:lnRef>
-            <a:fillRef idx="0">
-              <a:schemeClr val="dk1"/>
-            </a:fillRef>
-            <a:effectRef idx="0">
-              <a:schemeClr val="dk1"/>
-            </a:effectRef>
-            <a:fontRef idx="minor">
-              <a:schemeClr val="tx1"/>
-            </a:fontRef>
-          </p:style>
-        </p:cxnSp>
-        <p:cxnSp>
-          <p:nvCxnSpPr>
-            <p:cNvPr id="25" name="Straight Arrow Connector 24">
-              <a:extLst>
-                <a:ext uri="{FF2B5EF4-FFF2-40B4-BE49-F238E27FC236}">
-                  <a16:creationId xmlns:a16="http://schemas.microsoft.com/office/drawing/2014/main" id="{0B6EB840-0471-41A8-A6CC-623ABD24587E}"/>
-                </a:ext>
-              </a:extLst>
-            </p:cNvPr>
-            <p:cNvCxnSpPr>
-              <a:cxnSpLocks/>
-              <a:stCxn id="8" idx="0"/>
-              <a:endCxn id="9" idx="4"/>
-            </p:cNvCxnSpPr>
-            <p:nvPr/>
-          </p:nvCxnSpPr>
-          <p:spPr>
-            <a:xfrm flipV="1">
-              <a:off x="6718414" y="3996701"/>
-              <a:ext cx="0" cy="850285"/>
-            </a:xfrm>
-            <a:prstGeom prst="straightConnector1">
-              <a:avLst/>
-            </a:prstGeom>
-            <a:ln w="38100">
-              <a:tailEnd type="triangle"/>
-            </a:ln>
-          </p:spPr>
-          <p:style>
-            <a:lnRef idx="1">
-              <a:schemeClr val="dk1"/>
-            </a:lnRef>
-            <a:fillRef idx="0">
-              <a:schemeClr val="dk1"/>
-            </a:fillRef>
-            <a:effectRef idx="0">
-              <a:schemeClr val="dk1"/>
-            </a:effectRef>
-            <a:fontRef idx="minor">
-              <a:schemeClr val="tx1"/>
-            </a:fontRef>
-          </p:style>
-        </p:cxnSp>
-        <p:cxnSp>
-          <p:nvCxnSpPr>
-            <p:cNvPr id="33" name="Straight Arrow Connector 32">
-              <a:extLst>
-                <a:ext uri="{FF2B5EF4-FFF2-40B4-BE49-F238E27FC236}">
-                  <a16:creationId xmlns:a16="http://schemas.microsoft.com/office/drawing/2014/main" id="{E8069CDF-F3A9-46FB-A92D-2C3AC0363CD7}"/>
-                </a:ext>
-              </a:extLst>
-            </p:cNvPr>
-            <p:cNvCxnSpPr>
-              <a:cxnSpLocks/>
-              <a:endCxn id="5" idx="6"/>
-            </p:cNvCxnSpPr>
-            <p:nvPr/>
-          </p:nvCxnSpPr>
-          <p:spPr>
-            <a:xfrm flipH="1">
-              <a:off x="5002696" y="2146065"/>
-              <a:ext cx="2195523" cy="0"/>
-            </a:xfrm>
-            <a:prstGeom prst="straightConnector1">
-              <a:avLst/>
-            </a:prstGeom>
-            <a:ln w="38100">
-              <a:tailEnd type="triangle"/>
-            </a:ln>
-          </p:spPr>
-          <p:style>
-            <a:lnRef idx="1">
-              <a:schemeClr val="dk1"/>
-            </a:lnRef>
-            <a:fillRef idx="0">
-              <a:schemeClr val="dk1"/>
-            </a:fillRef>
-            <a:effectRef idx="0">
-              <a:schemeClr val="dk1"/>
-            </a:effectRef>
-            <a:fontRef idx="minor">
-              <a:schemeClr val="tx1"/>
-            </a:fontRef>
-          </p:style>
-        </p:cxnSp>
-        <mc:AlternateContent xmlns:mc="http://schemas.openxmlformats.org/markup-compatibility/2006">
-          <mc:Choice xmlns:a14="http://schemas.microsoft.com/office/drawing/2010/main" Requires="a14">
-            <p:sp>
-              <p:nvSpPr>
-                <p:cNvPr id="2" name="TextBox 1">
-                  <a:extLst>
-                    <a:ext uri="{FF2B5EF4-FFF2-40B4-BE49-F238E27FC236}">
-                      <a16:creationId xmlns:a16="http://schemas.microsoft.com/office/drawing/2014/main" id="{F968C7F8-B770-4C1C-8A9E-22AE269417A6}"/>
-                    </a:ext>
-                  </a:extLst>
-                </p:cNvPr>
-                <p:cNvSpPr txBox="1"/>
-                <p:nvPr/>
-              </p:nvSpPr>
-              <p:spPr>
-                <a:xfrm>
-                  <a:off x="4180348" y="5162561"/>
-                  <a:ext cx="1782302" cy="438217"/>
-                </a:xfrm>
-                <a:prstGeom prst="rect">
-                  <a:avLst/>
-                </a:prstGeom>
-                <a:noFill/>
-              </p:spPr>
-              <p:txBody>
-                <a:bodyPr wrap="square" rtlCol="0">
-                  <a:spAutoFit/>
-                </a:bodyPr>
-                <a:lstStyle/>
-                <a:p>
-                  <a:r>
-                    <a:rPr lang="en-US" sz="3211" dirty="0">
+              </a:prstGeom>
+              <a:ln w="38100">
+                <a:tailEnd type="triangle"/>
+              </a:ln>
+            </p:spPr>
+            <p:style>
+              <a:lnRef idx="1">
+                <a:schemeClr val="dk1"/>
+              </a:lnRef>
+              <a:fillRef idx="0">
+                <a:schemeClr val="dk1"/>
+              </a:fillRef>
+              <a:effectRef idx="0">
+                <a:schemeClr val="dk1"/>
+              </a:effectRef>
+              <a:fontRef idx="minor">
+                <a:schemeClr val="tx1"/>
+              </a:fontRef>
+            </p:style>
+          </p:cxnSp>
+          <p:cxnSp>
+            <p:nvCxnSpPr>
+              <p:cNvPr id="15" name="Straight Arrow Connector 14">
+                <a:extLst>
+                  <a:ext uri="{FF2B5EF4-FFF2-40B4-BE49-F238E27FC236}">
+                    <a16:creationId xmlns:a16="http://schemas.microsoft.com/office/drawing/2014/main" id="{D73F65A3-33FB-45A2-82E3-7925770DA803}"/>
+                  </a:ext>
+                </a:extLst>
+              </p:cNvPr>
+              <p:cNvCxnSpPr>
+                <a:cxnSpLocks/>
+                <a:stCxn id="5" idx="4"/>
+                <a:endCxn id="6" idx="0"/>
+              </p:cNvCxnSpPr>
+              <p:nvPr/>
+            </p:nvCxnSpPr>
+            <p:spPr>
+              <a:xfrm flipH="1">
+                <a:off x="3387702" y="2923305"/>
+                <a:ext cx="837754" cy="1923681"/>
+              </a:xfrm>
+              <a:prstGeom prst="straightConnector1">
+                <a:avLst/>
+              </a:prstGeom>
+              <a:ln w="38100">
+                <a:tailEnd type="triangle"/>
+              </a:ln>
+            </p:spPr>
+            <p:style>
+              <a:lnRef idx="1">
+                <a:schemeClr val="dk1"/>
+              </a:lnRef>
+              <a:fillRef idx="0">
+                <a:schemeClr val="dk1"/>
+              </a:fillRef>
+              <a:effectRef idx="0">
+                <a:schemeClr val="dk1"/>
+              </a:effectRef>
+              <a:fontRef idx="minor">
+                <a:schemeClr val="tx1"/>
+              </a:fontRef>
+            </p:style>
+          </p:cxnSp>
+          <p:cxnSp>
+            <p:nvCxnSpPr>
+              <p:cNvPr id="19" name="Straight Arrow Connector 18">
+                <a:extLst>
+                  <a:ext uri="{FF2B5EF4-FFF2-40B4-BE49-F238E27FC236}">
+                    <a16:creationId xmlns:a16="http://schemas.microsoft.com/office/drawing/2014/main" id="{A5C39A91-A887-40A1-9F49-9383F61E4B91}"/>
+                  </a:ext>
+                </a:extLst>
+              </p:cNvPr>
+              <p:cNvCxnSpPr>
+                <a:cxnSpLocks/>
+                <a:stCxn id="6" idx="6"/>
+                <a:endCxn id="8" idx="2"/>
+              </p:cNvCxnSpPr>
+              <p:nvPr/>
+            </p:nvCxnSpPr>
+            <p:spPr>
+              <a:xfrm>
+                <a:off x="4164942" y="5624226"/>
+                <a:ext cx="1998259" cy="0"/>
+              </a:xfrm>
+              <a:prstGeom prst="straightConnector1">
+                <a:avLst/>
+              </a:prstGeom>
+              <a:ln w="38100">
+                <a:tailEnd type="triangle"/>
+              </a:ln>
+            </p:spPr>
+            <p:style>
+              <a:lnRef idx="1">
+                <a:schemeClr val="dk1"/>
+              </a:lnRef>
+              <a:fillRef idx="0">
+                <a:schemeClr val="dk1"/>
+              </a:fillRef>
+              <a:effectRef idx="0">
+                <a:schemeClr val="dk1"/>
+              </a:effectRef>
+              <a:fontRef idx="minor">
+                <a:schemeClr val="tx1"/>
+              </a:fontRef>
+            </p:style>
+          </p:cxnSp>
+          <p:cxnSp>
+            <p:nvCxnSpPr>
+              <p:cNvPr id="25" name="Straight Arrow Connector 24">
+                <a:extLst>
+                  <a:ext uri="{FF2B5EF4-FFF2-40B4-BE49-F238E27FC236}">
+                    <a16:creationId xmlns:a16="http://schemas.microsoft.com/office/drawing/2014/main" id="{0B6EB840-0471-41A8-A6CC-623ABD24587E}"/>
+                  </a:ext>
+                </a:extLst>
+              </p:cNvPr>
+              <p:cNvCxnSpPr>
+                <a:cxnSpLocks/>
+                <a:stCxn id="8" idx="0"/>
+                <a:endCxn id="9" idx="4"/>
+              </p:cNvCxnSpPr>
+              <p:nvPr/>
+            </p:nvCxnSpPr>
+            <p:spPr>
+              <a:xfrm flipV="1">
+                <a:off x="6940441" y="3990267"/>
+                <a:ext cx="10951" cy="856719"/>
+              </a:xfrm>
+              <a:prstGeom prst="straightConnector1">
+                <a:avLst/>
+              </a:prstGeom>
+              <a:ln w="38100">
+                <a:tailEnd type="triangle"/>
+              </a:ln>
+            </p:spPr>
+            <p:style>
+              <a:lnRef idx="1">
+                <a:schemeClr val="dk1"/>
+              </a:lnRef>
+              <a:fillRef idx="0">
+                <a:schemeClr val="dk1"/>
+              </a:fillRef>
+              <a:effectRef idx="0">
+                <a:schemeClr val="dk1"/>
+              </a:effectRef>
+              <a:fontRef idx="minor">
+                <a:schemeClr val="tx1"/>
+              </a:fontRef>
+            </p:style>
+          </p:cxnSp>
+          <p:cxnSp>
+            <p:nvCxnSpPr>
+              <p:cNvPr id="33" name="Straight Arrow Connector 32">
+                <a:extLst>
+                  <a:ext uri="{FF2B5EF4-FFF2-40B4-BE49-F238E27FC236}">
+                    <a16:creationId xmlns:a16="http://schemas.microsoft.com/office/drawing/2014/main" id="{E8069CDF-F3A9-46FB-A92D-2C3AC0363CD7}"/>
+                  </a:ext>
+                </a:extLst>
+              </p:cNvPr>
+              <p:cNvCxnSpPr>
+                <a:cxnSpLocks/>
+                <a:endCxn id="5" idx="6"/>
+              </p:cNvCxnSpPr>
+              <p:nvPr/>
+            </p:nvCxnSpPr>
+            <p:spPr>
+              <a:xfrm flipH="1">
+                <a:off x="5002696" y="2146065"/>
+                <a:ext cx="2195523" cy="0"/>
+              </a:xfrm>
+              <a:prstGeom prst="straightConnector1">
+                <a:avLst/>
+              </a:prstGeom>
+              <a:ln w="38100">
+                <a:tailEnd type="triangle"/>
+              </a:ln>
+            </p:spPr>
+            <p:style>
+              <a:lnRef idx="1">
+                <a:schemeClr val="dk1"/>
+              </a:lnRef>
+              <a:fillRef idx="0">
+                <a:schemeClr val="dk1"/>
+              </a:fillRef>
+              <a:effectRef idx="0">
+                <a:schemeClr val="dk1"/>
+              </a:effectRef>
+              <a:fontRef idx="minor">
+                <a:schemeClr val="tx1"/>
+              </a:fontRef>
+            </p:style>
+          </p:cxnSp>
+          <mc:AlternateContent xmlns:mc="http://schemas.openxmlformats.org/markup-compatibility/2006">
+            <mc:Choice xmlns:a14="http://schemas.microsoft.com/office/drawing/2010/main" Requires="a14">
+              <p:sp>
+                <p:nvSpPr>
+                  <p:cNvPr id="2" name="TextBox 1">
+                    <a:extLst>
+                      <a:ext uri="{FF2B5EF4-FFF2-40B4-BE49-F238E27FC236}">
+                        <a16:creationId xmlns:a16="http://schemas.microsoft.com/office/drawing/2014/main" id="{F968C7F8-B770-4C1C-8A9E-22AE269417A6}"/>
+                      </a:ext>
+                    </a:extLst>
+                  </p:cNvPr>
+                  <p:cNvSpPr txBox="1"/>
+                  <p:nvPr/>
+                </p:nvSpPr>
+                <p:spPr>
+                  <a:xfrm>
+                    <a:off x="4130531" y="5160287"/>
+                    <a:ext cx="2091877" cy="438217"/>
+                  </a:xfrm>
+                  <a:prstGeom prst="rect">
+                    <a:avLst/>
+                  </a:prstGeom>
+                  <a:noFill/>
+                </p:spPr>
+                <p:txBody>
+                  <a:bodyPr wrap="square" rtlCol="0">
+                    <a:spAutoFit/>
+                  </a:bodyPr>
+                  <a:lstStyle/>
+                  <a:p>
+                    <a:r>
+                      <a:rPr lang="en-US" sz="3211" dirty="0">
+                        <a:latin typeface="Times New Roman" panose="02020603050405020304" pitchFamily="18" charset="0"/>
+                        <a:cs typeface="Times New Roman" panose="02020603050405020304" pitchFamily="18" charset="0"/>
+                      </a:rPr>
+                      <a:t>2) Fit </a:t>
+                    </a:r>
+                    <a14:m>
+                      <m:oMath xmlns:m="http://schemas.openxmlformats.org/officeDocument/2006/math">
+                        <m:sSup>
+                          <m:sSupPr>
+                            <m:ctrlPr>
+                              <a:rPr lang="en-US" sz="3211" i="1">
+                                <a:latin typeface="Cambria Math" panose="02040503050406030204" pitchFamily="18" charset="0"/>
+                              </a:rPr>
+                            </m:ctrlPr>
+                          </m:sSupPr>
+                          <m:e>
+                            <m:r>
+                              <a:rPr lang="en-US" sz="3211" i="1">
+                                <a:latin typeface="Cambria Math" panose="02040503050406030204" pitchFamily="18" charset="0"/>
+                              </a:rPr>
+                              <m:t>𝐴</m:t>
+                            </m:r>
+                          </m:e>
+                          <m:sup>
+                            <m:r>
+                              <m:rPr>
+                                <m:sty m:val="p"/>
+                              </m:rPr>
+                              <a:rPr lang="en-US" sz="3211">
+                                <a:latin typeface="Cambria Math" panose="02040503050406030204" pitchFamily="18" charset="0"/>
+                              </a:rPr>
+                              <m:t>r</m:t>
+                            </m:r>
+                          </m:sup>
+                        </m:sSup>
+                      </m:oMath>
+                    </a14:m>
+                    <a:r>
+                      <a:rPr lang="en-US" sz="3211" dirty="0">
+                        <a:latin typeface="Times New Roman" panose="02020603050405020304" pitchFamily="18" charset="0"/>
+                        <a:cs typeface="Times New Roman" panose="02020603050405020304" pitchFamily="18" charset="0"/>
+                      </a:rPr>
+                      <a:t> model</a:t>
+                    </a:r>
+                  </a:p>
+                </p:txBody>
+              </p:sp>
+            </mc:Choice>
+            <mc:Fallback>
+              <p:sp>
+                <p:nvSpPr>
+                  <p:cNvPr id="2" name="TextBox 1">
+                    <a:extLst>
+                      <a:ext uri="{FF2B5EF4-FFF2-40B4-BE49-F238E27FC236}">
+                        <a16:creationId xmlns:a16="http://schemas.microsoft.com/office/drawing/2014/main" id="{F968C7F8-B770-4C1C-8A9E-22AE269417A6}"/>
+                      </a:ext>
+                    </a:extLst>
+                  </p:cNvPr>
+                  <p:cNvSpPr txBox="1">
+                    <a:spLocks noRot="1" noChangeAspect="1" noMove="1" noResize="1" noEditPoints="1" noAdjustHandles="1" noChangeArrowheads="1" noChangeShapeType="1" noTextEdit="1"/>
+                  </p:cNvSpPr>
+                  <p:nvPr/>
+                </p:nvSpPr>
+                <p:spPr>
+                  <a:xfrm>
+                    <a:off x="4130531" y="5160287"/>
+                    <a:ext cx="2091877" cy="438217"/>
+                  </a:xfrm>
+                  <a:prstGeom prst="rect">
+                    <a:avLst/>
+                  </a:prstGeom>
+                  <a:blipFill>
+                    <a:blip r:embed="rId2"/>
+                    <a:stretch>
+                      <a:fillRect l="-5664" t="-13542" r="-1961" b="-33333"/>
+                    </a:stretch>
+                  </a:blipFill>
+                </p:spPr>
+                <p:txBody>
+                  <a:bodyPr/>
+                  <a:lstStyle/>
+                  <a:p>
+                    <a:r>
+                      <a:rPr lang="en-US">
+                        <a:noFill/>
+                      </a:rPr>
+                      <a:t> </a:t>
+                    </a:r>
+                  </a:p>
+                </p:txBody>
+              </p:sp>
+            </mc:Fallback>
+          </mc:AlternateContent>
+          <mc:AlternateContent xmlns:mc="http://schemas.openxmlformats.org/markup-compatibility/2006">
+            <mc:Choice xmlns:a14="http://schemas.microsoft.com/office/drawing/2010/main" Requires="a14">
+              <p:sp>
+                <p:nvSpPr>
+                  <p:cNvPr id="7" name="TextBox 6">
+                    <a:extLst>
+                      <a:ext uri="{FF2B5EF4-FFF2-40B4-BE49-F238E27FC236}">
+                        <a16:creationId xmlns:a16="http://schemas.microsoft.com/office/drawing/2014/main" id="{C742926C-7E22-435E-90FA-E9846B2A162F}"/>
+                      </a:ext>
+                    </a:extLst>
+                  </p:cNvPr>
+                  <p:cNvSpPr txBox="1"/>
+                  <p:nvPr/>
+                </p:nvSpPr>
+                <p:spPr>
+                  <a:xfrm>
+                    <a:off x="4039971" y="3236606"/>
+                    <a:ext cx="1356941" cy="1205742"/>
+                  </a:xfrm>
+                  <a:prstGeom prst="rect">
+                    <a:avLst/>
+                  </a:prstGeom>
+                  <a:noFill/>
+                </p:spPr>
+                <p:txBody>
+                  <a:bodyPr wrap="square" rtlCol="0">
+                    <a:spAutoFit/>
+                  </a:bodyPr>
+                  <a:lstStyle/>
+                  <a:p>
+                    <a:r>
+                      <a:rPr lang="en-US" sz="3211" dirty="0">
+                        <a:latin typeface="Times New Roman" panose="02020603050405020304" pitchFamily="18" charset="0"/>
+                        <a:cs typeface="Times New Roman" panose="02020603050405020304" pitchFamily="18" charset="0"/>
+                      </a:rPr>
+                      <a:t>1) </a:t>
+                    </a:r>
+                    <a14:m>
+                      <m:oMath xmlns:m="http://schemas.openxmlformats.org/officeDocument/2006/math">
+                        <m:sSubSup>
+                          <m:sSubSupPr>
+                            <m:ctrlPr>
+                              <a:rPr lang="en-US" sz="3211" i="1">
+                                <a:latin typeface="Cambria Math" panose="02040503050406030204" pitchFamily="18" charset="0"/>
+                              </a:rPr>
+                            </m:ctrlPr>
+                          </m:sSubSupPr>
+                          <m:e>
+                            <m:r>
+                              <a:rPr lang="en-US" sz="3211" i="1">
+                                <a:latin typeface="Cambria Math" panose="02040503050406030204" pitchFamily="18" charset="0"/>
+                              </a:rPr>
+                              <m:t>𝐴</m:t>
+                            </m:r>
+                          </m:e>
+                          <m:sub>
+                            <m:r>
+                              <a:rPr lang="en-US" sz="3211" i="1">
+                                <a:latin typeface="Cambria Math" panose="02040503050406030204" pitchFamily="18" charset="0"/>
+                              </a:rPr>
+                              <m:t>𝑥𝑦</m:t>
+                            </m:r>
+                          </m:sub>
+                          <m:sup>
+                            <m:r>
+                              <m:rPr>
+                                <m:sty m:val="p"/>
+                              </m:rPr>
+                              <a:rPr lang="en-US" sz="3211">
+                                <a:latin typeface="Cambria Math" panose="02040503050406030204" pitchFamily="18" charset="0"/>
+                              </a:rPr>
+                              <m:t>r</m:t>
+                            </m:r>
+                          </m:sup>
+                        </m:sSubSup>
+                        <m:r>
+                          <a:rPr lang="en-US" sz="3211" i="1">
+                            <a:latin typeface="Cambria Math" panose="02040503050406030204" pitchFamily="18" charset="0"/>
+                          </a:rPr>
+                          <m:t> </m:t>
+                        </m:r>
+                      </m:oMath>
+                    </a14:m>
+                    <a:r>
+                      <a:rPr lang="en-US" sz="3211" dirty="0">
+                        <a:latin typeface="Times New Roman" panose="02020603050405020304" pitchFamily="18" charset="0"/>
+                        <a:cs typeface="Times New Roman" panose="02020603050405020304" pitchFamily="18" charset="0"/>
+                      </a:rPr>
+                      <a:t>at extreme </a:t>
+                    </a:r>
+                    <a14:m>
+                      <m:oMath xmlns:m="http://schemas.openxmlformats.org/officeDocument/2006/math">
+                        <m:r>
+                          <a:rPr lang="en-US" sz="3211" i="1">
+                            <a:latin typeface="Cambria Math" panose="02040503050406030204" pitchFamily="18" charset="0"/>
+                          </a:rPr>
+                          <m:t>𝑇</m:t>
+                        </m:r>
+                      </m:oMath>
+                    </a14:m>
+                    <a:r>
+                      <a:rPr lang="en-US" sz="3211" dirty="0">
+                        <a:latin typeface="Times New Roman" panose="02020603050405020304" pitchFamily="18" charset="0"/>
+                        <a:cs typeface="Times New Roman" panose="02020603050405020304" pitchFamily="18" charset="0"/>
+                      </a:rPr>
+                      <a:t> and </a:t>
+                    </a:r>
+                    <a14:m>
+                      <m:oMath xmlns:m="http://schemas.openxmlformats.org/officeDocument/2006/math">
+                        <m:r>
+                          <a:rPr lang="en-US" sz="3211" i="1">
+                            <a:latin typeface="Cambria Math" panose="02040503050406030204" pitchFamily="18" charset="0"/>
+                          </a:rPr>
+                          <m:t>𝑃</m:t>
+                        </m:r>
+                      </m:oMath>
+                    </a14:m>
+                    <a:endParaRPr lang="en-US" sz="2714" dirty="0">
                       <a:latin typeface="Times New Roman" panose="02020603050405020304" pitchFamily="18" charset="0"/>
                       <a:cs typeface="Times New Roman" panose="02020603050405020304" pitchFamily="18" charset="0"/>
-                    </a:rPr>
-                    <a:t>Fit </a:t>
-                  </a:r>
-                  <a14:m>
-                    <m:oMath xmlns:m="http://schemas.openxmlformats.org/officeDocument/2006/math">
-                      <m:sSup>
-                        <m:sSupPr>
-                          <m:ctrlPr>
-                            <a:rPr lang="en-US" sz="3211" i="1">
-                              <a:latin typeface="Cambria Math" panose="02040503050406030204" pitchFamily="18" charset="0"/>
-                            </a:rPr>
-                          </m:ctrlPr>
-                        </m:sSupPr>
-                        <m:e>
-                          <m:r>
-                            <a:rPr lang="en-US" sz="3211" i="1">
-                              <a:latin typeface="Cambria Math" panose="02040503050406030204" pitchFamily="18" charset="0"/>
-                            </a:rPr>
-                            <m:t>𝐴</m:t>
-                          </m:r>
-                        </m:e>
-                        <m:sup>
-                          <m:r>
-                            <m:rPr>
-                              <m:sty m:val="p"/>
-                            </m:rPr>
-                            <a:rPr lang="en-US" sz="3211">
-                              <a:latin typeface="Cambria Math" panose="02040503050406030204" pitchFamily="18" charset="0"/>
-                            </a:rPr>
-                            <m:t>r</m:t>
-                          </m:r>
-                        </m:sup>
-                      </m:sSup>
-                    </m:oMath>
-                  </a14:m>
-                  <a:r>
-                    <a:rPr lang="en-US" sz="3211" dirty="0">
-                      <a:latin typeface="Times New Roman" panose="02020603050405020304" pitchFamily="18" charset="0"/>
-                      <a:cs typeface="Times New Roman" panose="02020603050405020304" pitchFamily="18" charset="0"/>
-                    </a:rPr>
-                    <a:t> model</a:t>
-                  </a:r>
-                </a:p>
-              </p:txBody>
-            </p:sp>
-          </mc:Choice>
-          <mc:Fallback>
-            <p:sp>
-              <p:nvSpPr>
-                <p:cNvPr id="2" name="TextBox 1">
-                  <a:extLst>
-                    <a:ext uri="{FF2B5EF4-FFF2-40B4-BE49-F238E27FC236}">
-                      <a16:creationId xmlns:a16="http://schemas.microsoft.com/office/drawing/2014/main" id="{F968C7F8-B770-4C1C-8A9E-22AE269417A6}"/>
-                    </a:ext>
-                  </a:extLst>
-                </p:cNvPr>
-                <p:cNvSpPr txBox="1">
-                  <a:spLocks noRot="1" noChangeAspect="1" noMove="1" noResize="1" noEditPoints="1" noAdjustHandles="1" noChangeArrowheads="1" noChangeShapeType="1" noTextEdit="1"/>
-                </p:cNvSpPr>
-                <p:nvPr/>
-              </p:nvSpPr>
-              <p:spPr>
-                <a:xfrm>
-                  <a:off x="4180348" y="5162561"/>
-                  <a:ext cx="1782302" cy="438217"/>
-                </a:xfrm>
-                <a:prstGeom prst="rect">
-                  <a:avLst/>
-                </a:prstGeom>
-                <a:blipFill>
-                  <a:blip r:embed="rId2"/>
-                  <a:stretch>
-                    <a:fillRect l="-6378" t="-13542" r="-1276" b="-33333"/>
-                  </a:stretch>
-                </a:blipFill>
-              </p:spPr>
-              <p:txBody>
-                <a:bodyPr/>
-                <a:lstStyle/>
-                <a:p>
-                  <a:r>
-                    <a:rPr lang="en-US">
-                      <a:noFill/>
-                    </a:rPr>
-                    <a:t> </a:t>
-                  </a:r>
-                </a:p>
-              </p:txBody>
-            </p:sp>
-          </mc:Fallback>
-        </mc:AlternateContent>
-        <mc:AlternateContent xmlns:mc="http://schemas.openxmlformats.org/markup-compatibility/2006">
-          <mc:Choice xmlns:a14="http://schemas.microsoft.com/office/drawing/2010/main" Requires="a14">
-            <p:sp>
-              <p:nvSpPr>
-                <p:cNvPr id="7" name="TextBox 6">
-                  <a:extLst>
-                    <a:ext uri="{FF2B5EF4-FFF2-40B4-BE49-F238E27FC236}">
-                      <a16:creationId xmlns:a16="http://schemas.microsoft.com/office/drawing/2014/main" id="{C742926C-7E22-435E-90FA-E9846B2A162F}"/>
-                    </a:ext>
-                  </a:extLst>
-                </p:cNvPr>
-                <p:cNvSpPr txBox="1"/>
-                <p:nvPr/>
-              </p:nvSpPr>
-              <p:spPr>
-                <a:xfrm>
-                  <a:off x="4065046" y="3228862"/>
-                  <a:ext cx="1356941" cy="1205742"/>
-                </a:xfrm>
-                <a:prstGeom prst="rect">
-                  <a:avLst/>
-                </a:prstGeom>
-                <a:noFill/>
-              </p:spPr>
-              <p:txBody>
-                <a:bodyPr wrap="square" rtlCol="0">
-                  <a:spAutoFit/>
-                </a:bodyPr>
-                <a:lstStyle/>
-                <a:p>
-                  <a14:m>
-                    <m:oMath xmlns:m="http://schemas.openxmlformats.org/officeDocument/2006/math">
-                      <m:sSubSup>
-                        <m:sSubSupPr>
-                          <m:ctrlPr>
-                            <a:rPr lang="en-US" sz="3211" i="1">
-                              <a:latin typeface="Cambria Math" panose="02040503050406030204" pitchFamily="18" charset="0"/>
-                            </a:rPr>
-                          </m:ctrlPr>
-                        </m:sSubSupPr>
-                        <m:e>
-                          <m:r>
-                            <a:rPr lang="en-US" sz="3211" i="1">
-                              <a:latin typeface="Cambria Math" panose="02040503050406030204" pitchFamily="18" charset="0"/>
-                            </a:rPr>
-                            <m:t>𝐴</m:t>
-                          </m:r>
-                        </m:e>
-                        <m:sub>
-                          <m:r>
-                            <a:rPr lang="en-US" sz="3211" i="1">
-                              <a:latin typeface="Cambria Math" panose="02040503050406030204" pitchFamily="18" charset="0"/>
-                            </a:rPr>
-                            <m:t>𝑥𝑦</m:t>
-                          </m:r>
-                        </m:sub>
-                        <m:sup>
-                          <m:r>
-                            <m:rPr>
-                              <m:sty m:val="p"/>
-                            </m:rPr>
-                            <a:rPr lang="en-US" sz="3211">
-                              <a:latin typeface="Cambria Math" panose="02040503050406030204" pitchFamily="18" charset="0"/>
-                            </a:rPr>
-                            <m:t>r</m:t>
-                          </m:r>
-                        </m:sup>
-                      </m:sSubSup>
-                      <m:r>
-                        <a:rPr lang="en-US" sz="3211" i="1">
-                          <a:latin typeface="Cambria Math" panose="02040503050406030204" pitchFamily="18" charset="0"/>
-                        </a:rPr>
-                        <m:t> </m:t>
-                      </m:r>
-                    </m:oMath>
-                  </a14:m>
-                  <a:r>
-                    <a:rPr lang="en-US" sz="3211" dirty="0">
-                      <a:latin typeface="Times New Roman" panose="02020603050405020304" pitchFamily="18" charset="0"/>
-                      <a:cs typeface="Times New Roman" panose="02020603050405020304" pitchFamily="18" charset="0"/>
-                    </a:rPr>
-                    <a:t>at extreme </a:t>
-                  </a:r>
-                  <a14:m>
-                    <m:oMath xmlns:m="http://schemas.openxmlformats.org/officeDocument/2006/math">
-                      <m:r>
-                        <a:rPr lang="en-US" sz="3211" i="1">
-                          <a:latin typeface="Cambria Math" panose="02040503050406030204" pitchFamily="18" charset="0"/>
-                        </a:rPr>
-                        <m:t>𝑇</m:t>
-                      </m:r>
-                    </m:oMath>
-                  </a14:m>
-                  <a:r>
-                    <a:rPr lang="en-US" sz="3211" dirty="0">
-                      <a:latin typeface="Times New Roman" panose="02020603050405020304" pitchFamily="18" charset="0"/>
-                      <a:cs typeface="Times New Roman" panose="02020603050405020304" pitchFamily="18" charset="0"/>
-                    </a:rPr>
-                    <a:t> and </a:t>
-                  </a:r>
-                  <a14:m>
-                    <m:oMath xmlns:m="http://schemas.openxmlformats.org/officeDocument/2006/math">
-                      <m:r>
-                        <a:rPr lang="en-US" sz="3211" i="1">
-                          <a:latin typeface="Cambria Math" panose="02040503050406030204" pitchFamily="18" charset="0"/>
-                        </a:rPr>
-                        <m:t>𝑃</m:t>
-                      </m:r>
-                    </m:oMath>
-                  </a14:m>
-                  <a:endParaRPr lang="en-US" sz="2714" dirty="0">
-                    <a:latin typeface="Times New Roman" panose="02020603050405020304" pitchFamily="18" charset="0"/>
-                    <a:cs typeface="Times New Roman" panose="02020603050405020304" pitchFamily="18" charset="0"/>
-                  </a:endParaRPr>
-                </a:p>
-              </p:txBody>
-            </p:sp>
-          </mc:Choice>
-          <mc:Fallback>
-            <p:sp>
-              <p:nvSpPr>
-                <p:cNvPr id="7" name="TextBox 6">
-                  <a:extLst>
-                    <a:ext uri="{FF2B5EF4-FFF2-40B4-BE49-F238E27FC236}">
-                      <a16:creationId xmlns:a16="http://schemas.microsoft.com/office/drawing/2014/main" id="{C742926C-7E22-435E-90FA-E9846B2A162F}"/>
-                    </a:ext>
-                  </a:extLst>
-                </p:cNvPr>
-                <p:cNvSpPr txBox="1">
-                  <a:spLocks noRot="1" noChangeAspect="1" noMove="1" noResize="1" noEditPoints="1" noAdjustHandles="1" noChangeArrowheads="1" noChangeShapeType="1" noTextEdit="1"/>
-                </p:cNvSpPr>
-                <p:nvPr/>
-              </p:nvSpPr>
-              <p:spPr>
-                <a:xfrm>
-                  <a:off x="4065046" y="3228862"/>
-                  <a:ext cx="1356941" cy="1205742"/>
-                </a:xfrm>
-                <a:prstGeom prst="rect">
-                  <a:avLst/>
-                </a:prstGeom>
-                <a:blipFill>
-                  <a:blip r:embed="rId3"/>
-                  <a:stretch>
-                    <a:fillRect l="-8389" t="-5283" b="-10943"/>
-                  </a:stretch>
-                </a:blipFill>
-              </p:spPr>
-              <p:txBody>
-                <a:bodyPr/>
-                <a:lstStyle/>
-                <a:p>
-                  <a:r>
-                    <a:rPr lang="en-US">
-                      <a:noFill/>
-                    </a:rPr>
-                    <a:t> </a:t>
-                  </a:r>
-                </a:p>
-              </p:txBody>
-            </p:sp>
-          </mc:Fallback>
-        </mc:AlternateContent>
-        <mc:AlternateContent xmlns:mc="http://schemas.openxmlformats.org/markup-compatibility/2006">
-          <mc:Choice xmlns:a14="http://schemas.microsoft.com/office/drawing/2010/main" Requires="a14">
-            <p:sp>
-              <p:nvSpPr>
-                <p:cNvPr id="12" name="TextBox 11">
-                  <a:extLst>
-                    <a:ext uri="{FF2B5EF4-FFF2-40B4-BE49-F238E27FC236}">
-                      <a16:creationId xmlns:a16="http://schemas.microsoft.com/office/drawing/2014/main" id="{B441737D-8BAA-4A0B-A131-B02A84E5181F}"/>
-                    </a:ext>
-                  </a:extLst>
-                </p:cNvPr>
-                <p:cNvSpPr txBox="1"/>
-                <p:nvPr/>
-              </p:nvSpPr>
-              <p:spPr>
-                <a:xfrm>
-                  <a:off x="6718414" y="4015989"/>
-                  <a:ext cx="1393331" cy="807437"/>
-                </a:xfrm>
-                <a:prstGeom prst="rect">
-                  <a:avLst/>
-                </a:prstGeom>
-                <a:noFill/>
-              </p:spPr>
-              <p:txBody>
-                <a:bodyPr wrap="square" rtlCol="0">
-                  <a:spAutoFit/>
-                </a:bodyPr>
-                <a:lstStyle/>
-                <a:p>
-                  <a:r>
-                    <a:rPr lang="en-US" sz="3211" dirty="0">
-                      <a:latin typeface="Times New Roman" panose="02020603050405020304" pitchFamily="18" charset="0"/>
-                      <a:cs typeface="Times New Roman" panose="02020603050405020304" pitchFamily="18" charset="0"/>
-                    </a:rPr>
-                    <a:t>Optimize</a:t>
-                  </a:r>
-                </a:p>
-                <a:p>
-                  <a14:m>
-                    <m:oMathPara xmlns:m="http://schemas.openxmlformats.org/officeDocument/2006/math">
-                      <m:oMathParaPr>
-                        <m:jc m:val="centerGroup"/>
-                      </m:oMathParaPr>
+                    </a:endParaRPr>
+                  </a:p>
+                </p:txBody>
+              </p:sp>
+            </mc:Choice>
+            <mc:Fallback>
+              <p:sp>
+                <p:nvSpPr>
+                  <p:cNvPr id="7" name="TextBox 6">
+                    <a:extLst>
+                      <a:ext uri="{FF2B5EF4-FFF2-40B4-BE49-F238E27FC236}">
+                        <a16:creationId xmlns:a16="http://schemas.microsoft.com/office/drawing/2014/main" id="{C742926C-7E22-435E-90FA-E9846B2A162F}"/>
+                      </a:ext>
+                    </a:extLst>
+                  </p:cNvPr>
+                  <p:cNvSpPr txBox="1">
+                    <a:spLocks noRot="1" noChangeAspect="1" noMove="1" noResize="1" noEditPoints="1" noAdjustHandles="1" noChangeArrowheads="1" noChangeShapeType="1" noTextEdit="1"/>
+                  </p:cNvSpPr>
+                  <p:nvPr/>
+                </p:nvSpPr>
+                <p:spPr>
+                  <a:xfrm>
+                    <a:off x="4039971" y="3236606"/>
+                    <a:ext cx="1356941" cy="1205742"/>
+                  </a:xfrm>
+                  <a:prstGeom prst="rect">
+                    <a:avLst/>
+                  </a:prstGeom>
+                  <a:blipFill>
+                    <a:blip r:embed="rId3"/>
+                    <a:stretch>
+                      <a:fillRect l="-8725" t="-5303" r="-5034" b="-11364"/>
+                    </a:stretch>
+                  </a:blipFill>
+                </p:spPr>
+                <p:txBody>
+                  <a:bodyPr/>
+                  <a:lstStyle/>
+                  <a:p>
+                    <a:r>
+                      <a:rPr lang="en-US">
+                        <a:noFill/>
+                      </a:rPr>
+                      <a:t> </a:t>
+                    </a:r>
+                  </a:p>
+                </p:txBody>
+              </p:sp>
+            </mc:Fallback>
+          </mc:AlternateContent>
+          <mc:AlternateContent xmlns:mc="http://schemas.openxmlformats.org/markup-compatibility/2006">
+            <mc:Choice xmlns:a14="http://schemas.microsoft.com/office/drawing/2010/main" Requires="a14">
+              <p:sp>
+                <p:nvSpPr>
+                  <p:cNvPr id="12" name="TextBox 11">
+                    <a:extLst>
+                      <a:ext uri="{FF2B5EF4-FFF2-40B4-BE49-F238E27FC236}">
+                        <a16:creationId xmlns:a16="http://schemas.microsoft.com/office/drawing/2014/main" id="{B441737D-8BAA-4A0B-A131-B02A84E5181F}"/>
+                      </a:ext>
+                    </a:extLst>
+                  </p:cNvPr>
+                  <p:cNvSpPr txBox="1"/>
+                  <p:nvPr/>
+                </p:nvSpPr>
+                <p:spPr>
+                  <a:xfrm>
+                    <a:off x="7076516" y="4007864"/>
+                    <a:ext cx="1787951" cy="836522"/>
+                  </a:xfrm>
+                  <a:prstGeom prst="rect">
+                    <a:avLst/>
+                  </a:prstGeom>
+                  <a:noFill/>
+                </p:spPr>
+                <p:txBody>
+                  <a:bodyPr wrap="square" rtlCol="0">
+                    <a:spAutoFit/>
+                  </a:bodyPr>
+                  <a:lstStyle/>
+                  <a:p>
+                    <a:r>
+                      <a:rPr lang="en-US" sz="3211" dirty="0">
+                        <a:latin typeface="Times New Roman" panose="02020603050405020304" pitchFamily="18" charset="0"/>
+                        <a:cs typeface="Times New Roman" panose="02020603050405020304" pitchFamily="18" charset="0"/>
+                      </a:rPr>
+                      <a:t>3) Optimize</a:t>
+                    </a:r>
+                  </a:p>
+                  <a:p>
+                    <a:pPr/>
+                    <a14:m>
                       <m:oMath xmlns:m="http://schemas.openxmlformats.org/officeDocument/2006/math">
                         <m:sSub>
                           <m:sSubPr>
@@ -3901,151 +3934,383 @@
                           </m:sub>
                         </m:sSub>
                       </m:oMath>
-                    </m:oMathPara>
-                  </a14:m>
-                  <a:endParaRPr lang="en-US" sz="3211" dirty="0">
+                    </a14:m>
+                    <a:r>
+                      <a:rPr lang="en-US" sz="3211" dirty="0">
+                        <a:latin typeface="Times New Roman" panose="02020603050405020304" pitchFamily="18" charset="0"/>
+                        <a:cs typeface="Times New Roman" panose="02020603050405020304" pitchFamily="18" charset="0"/>
+                      </a:rPr>
+                      <a:t> with </a:t>
+                    </a:r>
+                    <a14:m>
+                      <m:oMath xmlns:m="http://schemas.openxmlformats.org/officeDocument/2006/math">
+                        <m:sSubSup>
+                          <m:sSubSupPr>
+                            <m:ctrlPr>
+                              <a:rPr lang="en-US" sz="3211" i="1">
+                                <a:latin typeface="Cambria Math" panose="02040503050406030204" pitchFamily="18" charset="0"/>
+                              </a:rPr>
+                            </m:ctrlPr>
+                          </m:sSubSupPr>
+                          <m:e>
+                            <m:r>
+                              <a:rPr lang="en-US" sz="3211" i="1">
+                                <a:latin typeface="Cambria Math" panose="02040503050406030204" pitchFamily="18" charset="0"/>
+                              </a:rPr>
+                              <m:t>𝐴</m:t>
+                            </m:r>
+                          </m:e>
+                          <m:sub>
+                            <m:r>
+                              <a:rPr lang="en-US" sz="3211" i="1">
+                                <a:latin typeface="Cambria Math" panose="02040503050406030204" pitchFamily="18" charset="0"/>
+                              </a:rPr>
+                              <m:t>𝑥𝑦</m:t>
+                            </m:r>
+                          </m:sub>
+                          <m:sup>
+                            <m:r>
+                              <m:rPr>
+                                <m:sty m:val="p"/>
+                              </m:rPr>
+                              <a:rPr lang="en-US" sz="3211">
+                                <a:latin typeface="Cambria Math" panose="02040503050406030204" pitchFamily="18" charset="0"/>
+                              </a:rPr>
+                              <m:t>r</m:t>
+                            </m:r>
+                          </m:sup>
+                        </m:sSubSup>
+                        <m:r>
+                          <a:rPr lang="en-US" sz="3211" i="1">
+                            <a:latin typeface="Cambria Math" panose="02040503050406030204" pitchFamily="18" charset="0"/>
+                          </a:rPr>
+                          <m:t> </m:t>
+                        </m:r>
+                      </m:oMath>
+                    </a14:m>
+                    <a:endParaRPr lang="en-US" sz="3211" dirty="0">
+                      <a:latin typeface="Times New Roman" panose="02020603050405020304" pitchFamily="18" charset="0"/>
+                      <a:cs typeface="Times New Roman" panose="02020603050405020304" pitchFamily="18" charset="0"/>
+                    </a:endParaRPr>
+                  </a:p>
+                </p:txBody>
+              </p:sp>
+            </mc:Choice>
+            <mc:Fallback>
+              <p:sp>
+                <p:nvSpPr>
+                  <p:cNvPr id="12" name="TextBox 11">
+                    <a:extLst>
+                      <a:ext uri="{FF2B5EF4-FFF2-40B4-BE49-F238E27FC236}">
+                        <a16:creationId xmlns:a16="http://schemas.microsoft.com/office/drawing/2014/main" id="{B441737D-8BAA-4A0B-A131-B02A84E5181F}"/>
+                      </a:ext>
+                    </a:extLst>
+                  </p:cNvPr>
+                  <p:cNvSpPr txBox="1">
+                    <a:spLocks noRot="1" noChangeAspect="1" noMove="1" noResize="1" noEditPoints="1" noAdjustHandles="1" noChangeArrowheads="1" noChangeShapeType="1" noTextEdit="1"/>
+                  </p:cNvSpPr>
+                  <p:nvPr/>
+                </p:nvSpPr>
+                <p:spPr>
+                  <a:xfrm>
+                    <a:off x="7076516" y="4007864"/>
+                    <a:ext cx="1787951" cy="836522"/>
+                  </a:xfrm>
+                  <a:prstGeom prst="rect">
+                    <a:avLst/>
+                  </a:prstGeom>
+                  <a:blipFill>
+                    <a:blip r:embed="rId4"/>
+                    <a:stretch>
+                      <a:fillRect l="-6361" t="-7065" b="-12500"/>
+                    </a:stretch>
+                  </a:blipFill>
+                </p:spPr>
+                <p:txBody>
+                  <a:bodyPr/>
+                  <a:lstStyle/>
+                  <a:p>
+                    <a:r>
+                      <a:rPr lang="en-US">
+                        <a:noFill/>
+                      </a:rPr>
+                      <a:t> </a:t>
+                    </a:r>
+                  </a:p>
+                </p:txBody>
+              </p:sp>
+            </mc:Fallback>
+          </mc:AlternateContent>
+          <p:cxnSp>
+            <p:nvCxnSpPr>
+              <p:cNvPr id="20" name="Straight Arrow Connector 19">
+                <a:extLst>
+                  <a:ext uri="{FF2B5EF4-FFF2-40B4-BE49-F238E27FC236}">
+                    <a16:creationId xmlns:a16="http://schemas.microsoft.com/office/drawing/2014/main" id="{E22E67D4-3A3C-4CAE-BBC6-80429865B400}"/>
+                  </a:ext>
+                </a:extLst>
+              </p:cNvPr>
+              <p:cNvCxnSpPr>
+                <a:cxnSpLocks/>
+                <a:endCxn id="28" idx="2"/>
+              </p:cNvCxnSpPr>
+              <p:nvPr/>
+            </p:nvCxnSpPr>
+            <p:spPr>
+              <a:xfrm>
+                <a:off x="6699540" y="2146065"/>
+                <a:ext cx="1918590" cy="0"/>
+              </a:xfrm>
+              <a:prstGeom prst="straightConnector1">
+                <a:avLst/>
+              </a:prstGeom>
+              <a:ln w="38100">
+                <a:tailEnd type="triangle"/>
+              </a:ln>
+            </p:spPr>
+            <p:style>
+              <a:lnRef idx="1">
+                <a:schemeClr val="dk1"/>
+              </a:lnRef>
+              <a:fillRef idx="0">
+                <a:schemeClr val="dk1"/>
+              </a:fillRef>
+              <a:effectRef idx="0">
+                <a:schemeClr val="dk1"/>
+              </a:effectRef>
+              <a:fontRef idx="minor">
+                <a:schemeClr val="tx1"/>
+              </a:fontRef>
+            </p:style>
+          </p:cxnSp>
+          <p:cxnSp>
+            <p:nvCxnSpPr>
+              <p:cNvPr id="22" name="Straight Arrow Connector 21">
+                <a:extLst>
+                  <a:ext uri="{FF2B5EF4-FFF2-40B4-BE49-F238E27FC236}">
+                    <a16:creationId xmlns:a16="http://schemas.microsoft.com/office/drawing/2014/main" id="{FB4A9BA3-D124-4C16-AC70-AA788853991A}"/>
+                  </a:ext>
+                </a:extLst>
+              </p:cNvPr>
+              <p:cNvCxnSpPr>
+                <a:cxnSpLocks/>
+                <a:stCxn id="9" idx="0"/>
+              </p:cNvCxnSpPr>
+              <p:nvPr/>
+            </p:nvCxnSpPr>
+            <p:spPr>
+              <a:xfrm flipV="1">
+                <a:off x="6951392" y="2130231"/>
+                <a:ext cx="0" cy="305556"/>
+              </a:xfrm>
+              <a:prstGeom prst="straightConnector1">
+                <a:avLst/>
+              </a:prstGeom>
+              <a:ln w="38100">
+                <a:tailEnd type="triangle"/>
+              </a:ln>
+            </p:spPr>
+            <p:style>
+              <a:lnRef idx="1">
+                <a:schemeClr val="dk1"/>
+              </a:lnRef>
+              <a:fillRef idx="0">
+                <a:schemeClr val="dk1"/>
+              </a:fillRef>
+              <a:effectRef idx="0">
+                <a:schemeClr val="dk1"/>
+              </a:effectRef>
+              <a:fontRef idx="minor">
+                <a:schemeClr val="tx1"/>
+              </a:fontRef>
+            </p:style>
+          </p:cxnSp>
+          <p:sp>
+            <p:nvSpPr>
+              <p:cNvPr id="21" name="TextBox 20">
+                <a:extLst>
+                  <a:ext uri="{FF2B5EF4-FFF2-40B4-BE49-F238E27FC236}">
+                    <a16:creationId xmlns:a16="http://schemas.microsoft.com/office/drawing/2014/main" id="{250FD59C-4601-48AA-ABC1-7E8950108D41}"/>
+                  </a:ext>
+                </a:extLst>
+              </p:cNvPr>
+              <p:cNvSpPr txBox="1"/>
+              <p:nvPr/>
+            </p:nvSpPr>
+            <p:spPr>
+              <a:xfrm>
+                <a:off x="5892191" y="1687856"/>
+                <a:ext cx="2127610" cy="438217"/>
+              </a:xfrm>
+              <a:prstGeom prst="rect">
+                <a:avLst/>
+              </a:prstGeom>
+              <a:noFill/>
+            </p:spPr>
+            <p:txBody>
+              <a:bodyPr wrap="square" rtlCol="0">
+                <a:spAutoFit/>
+              </a:bodyPr>
+              <a:lstStyle/>
+              <a:p>
+                <a:r>
+                  <a:rPr lang="en-US" sz="3211" dirty="0">
                     <a:latin typeface="Times New Roman" panose="02020603050405020304" pitchFamily="18" charset="0"/>
                     <a:cs typeface="Times New Roman" panose="02020603050405020304" pitchFamily="18" charset="0"/>
-                  </a:endParaRPr>
-                </a:p>
-              </p:txBody>
-            </p:sp>
-          </mc:Choice>
-          <mc:Fallback>
-            <p:sp>
-              <p:nvSpPr>
-                <p:cNvPr id="12" name="TextBox 11">
-                  <a:extLst>
-                    <a:ext uri="{FF2B5EF4-FFF2-40B4-BE49-F238E27FC236}">
-                      <a16:creationId xmlns:a16="http://schemas.microsoft.com/office/drawing/2014/main" id="{B441737D-8BAA-4A0B-A131-B02A84E5181F}"/>
-                    </a:ext>
-                  </a:extLst>
-                </p:cNvPr>
-                <p:cNvSpPr txBox="1">
-                  <a:spLocks noRot="1" noChangeAspect="1" noMove="1" noResize="1" noEditPoints="1" noAdjustHandles="1" noChangeArrowheads="1" noChangeShapeType="1" noTextEdit="1"/>
-                </p:cNvSpPr>
-                <p:nvPr/>
-              </p:nvSpPr>
-              <p:spPr>
-                <a:xfrm>
-                  <a:off x="6718414" y="4015989"/>
-                  <a:ext cx="1393331" cy="807437"/>
-                </a:xfrm>
-                <a:prstGeom prst="rect">
+                  </a:rPr>
+                  <a:t>Self-consistent?</a:t>
+                </a:r>
+              </a:p>
+            </p:txBody>
+          </p:sp>
+          <p:sp>
+            <p:nvSpPr>
+              <p:cNvPr id="24" name="TextBox 23">
+                <a:extLst>
+                  <a:ext uri="{FF2B5EF4-FFF2-40B4-BE49-F238E27FC236}">
+                    <a16:creationId xmlns:a16="http://schemas.microsoft.com/office/drawing/2014/main" id="{645D7789-AB2C-48D3-B39A-15B15007EC50}"/>
+                  </a:ext>
+                </a:extLst>
+              </p:cNvPr>
+              <p:cNvSpPr txBox="1"/>
+              <p:nvPr/>
+            </p:nvSpPr>
+            <p:spPr>
+              <a:xfrm>
+                <a:off x="5058748" y="1687856"/>
+                <a:ext cx="678470" cy="438217"/>
+              </a:xfrm>
+              <a:prstGeom prst="rect">
+                <a:avLst/>
+              </a:prstGeom>
+              <a:noFill/>
+            </p:spPr>
+            <p:txBody>
+              <a:bodyPr wrap="square" rtlCol="0">
+                <a:spAutoFit/>
+              </a:bodyPr>
+              <a:lstStyle/>
+              <a:p>
+                <a:r>
+                  <a:rPr lang="en-US" sz="3211" dirty="0">
+                    <a:latin typeface="Times New Roman" panose="02020603050405020304" pitchFamily="18" charset="0"/>
+                    <a:cs typeface="Times New Roman" panose="02020603050405020304" pitchFamily="18" charset="0"/>
+                  </a:rPr>
+                  <a:t>No</a:t>
+                </a:r>
+              </a:p>
+            </p:txBody>
+          </p:sp>
+          <p:sp>
+            <p:nvSpPr>
+              <p:cNvPr id="27" name="TextBox 26">
+                <a:extLst>
+                  <a:ext uri="{FF2B5EF4-FFF2-40B4-BE49-F238E27FC236}">
+                    <a16:creationId xmlns:a16="http://schemas.microsoft.com/office/drawing/2014/main" id="{D33F5B93-D43B-443F-B595-D0D5CFC87AB1}"/>
+                  </a:ext>
+                </a:extLst>
+              </p:cNvPr>
+              <p:cNvSpPr txBox="1"/>
+              <p:nvPr/>
+            </p:nvSpPr>
+            <p:spPr>
+              <a:xfrm>
+                <a:off x="8014948" y="1679526"/>
+                <a:ext cx="678470" cy="438217"/>
+              </a:xfrm>
+              <a:prstGeom prst="rect">
+                <a:avLst/>
+              </a:prstGeom>
+              <a:noFill/>
+            </p:spPr>
+            <p:txBody>
+              <a:bodyPr wrap="square" rtlCol="0">
+                <a:spAutoFit/>
+              </a:bodyPr>
+              <a:lstStyle/>
+              <a:p>
+                <a:r>
+                  <a:rPr lang="en-US" sz="3211" dirty="0">
+                    <a:latin typeface="Times New Roman" panose="02020603050405020304" pitchFamily="18" charset="0"/>
+                    <a:cs typeface="Times New Roman" panose="02020603050405020304" pitchFamily="18" charset="0"/>
+                  </a:rPr>
+                  <a:t>Yes</a:t>
+                </a:r>
+              </a:p>
+            </p:txBody>
+          </p:sp>
+          <p:sp>
+            <p:nvSpPr>
+              <p:cNvPr id="28" name="Oval 27">
+                <a:extLst>
+                  <a:ext uri="{FF2B5EF4-FFF2-40B4-BE49-F238E27FC236}">
+                    <a16:creationId xmlns:a16="http://schemas.microsoft.com/office/drawing/2014/main" id="{0A5B419D-ACE8-4AFC-8C40-B8546745FC28}"/>
+                  </a:ext>
+                </a:extLst>
+              </p:cNvPr>
+              <p:cNvSpPr/>
+              <p:nvPr/>
+            </p:nvSpPr>
+            <p:spPr>
+              <a:xfrm>
+                <a:off x="8618127" y="1368825"/>
+                <a:ext cx="1554480" cy="1554480"/>
+              </a:xfrm>
+              <a:prstGeom prst="ellipse">
+                <a:avLst/>
+              </a:prstGeom>
+              <a:solidFill>
+                <a:schemeClr val="bg1"/>
+              </a:solidFill>
+              <a:ln w="38100">
+                <a:solidFill>
+                  <a:srgbClr val="FF0000"/>
+                </a:solidFill>
+              </a:ln>
+            </p:spPr>
+            <p:style>
+              <a:lnRef idx="2">
+                <a:schemeClr val="accent1">
+                  <a:shade val="50000"/>
+                </a:schemeClr>
+              </a:lnRef>
+              <a:fillRef idx="1">
+                <a:schemeClr val="accent1"/>
+              </a:fillRef>
+              <a:effectRef idx="0">
+                <a:schemeClr val="accent1"/>
+              </a:effectRef>
+              <a:fontRef idx="minor">
+                <a:schemeClr val="lt1"/>
+              </a:fontRef>
+            </p:style>
+            <p:txBody>
+              <a:bodyPr rot="0" spcFirstLastPara="0" vertOverflow="overflow" horzOverflow="overflow" vert="horz" wrap="square" lIns="0" tIns="0" rIns="0" bIns="0" numCol="1" spcCol="0" rtlCol="0" fromWordArt="0" anchor="ctr" anchorCtr="0" forceAA="0" compatLnSpc="1">
+                <a:prstTxWarp prst="textNoShape">
                   <a:avLst/>
-                </a:prstGeom>
-                <a:blipFill>
-                  <a:blip r:embed="rId4"/>
-                  <a:stretch>
-                    <a:fillRect l="-8497" t="-7345"/>
-                  </a:stretch>
-                </a:blipFill>
-              </p:spPr>
-              <p:txBody>
-                <a:bodyPr/>
-                <a:lstStyle/>
-                <a:p>
-                  <a:r>
-                    <a:rPr lang="en-US">
-                      <a:noFill/>
-                    </a:rPr>
-                    <a:t> </a:t>
-                  </a:r>
-                </a:p>
-              </p:txBody>
-            </p:sp>
-          </mc:Fallback>
-        </mc:AlternateContent>
-        <p:cxnSp>
-          <p:nvCxnSpPr>
-            <p:cNvPr id="20" name="Straight Arrow Connector 19">
+                </a:prstTxWarp>
+                <a:noAutofit/>
+              </a:bodyPr>
+              <a:lstStyle/>
+              <a:p>
+                <a:pPr algn="ctr"/>
+                <a:endParaRPr lang="en-US" sz="2900" dirty="0">
+                  <a:solidFill>
+                    <a:sysClr val="windowText" lastClr="000000"/>
+                  </a:solidFill>
+                  <a:latin typeface="Times New Roman" panose="02020603050405020304" pitchFamily="18" charset="0"/>
+                  <a:cs typeface="Times New Roman" panose="02020603050405020304" pitchFamily="18" charset="0"/>
+                </a:endParaRPr>
+              </a:p>
+            </p:txBody>
+          </p:sp>
+        </p:grpSp>
+        <p:sp>
+          <p:nvSpPr>
+            <p:cNvPr id="16" name="TextBox 15">
               <a:extLst>
                 <a:ext uri="{FF2B5EF4-FFF2-40B4-BE49-F238E27FC236}">
-                  <a16:creationId xmlns:a16="http://schemas.microsoft.com/office/drawing/2014/main" id="{E22E67D4-3A3C-4CAE-BBC6-80429865B400}"/>
-                </a:ext>
-              </a:extLst>
-            </p:cNvPr>
-            <p:cNvCxnSpPr>
-              <a:cxnSpLocks/>
-              <a:endCxn id="28" idx="2"/>
-            </p:cNvCxnSpPr>
-            <p:nvPr/>
-          </p:nvCxnSpPr>
-          <p:spPr>
-            <a:xfrm>
-              <a:off x="6572742" y="2146065"/>
-              <a:ext cx="1918590" cy="0"/>
-            </a:xfrm>
-            <a:prstGeom prst="straightConnector1">
-              <a:avLst/>
-            </a:prstGeom>
-            <a:ln w="38100">
-              <a:tailEnd type="triangle"/>
-            </a:ln>
-          </p:spPr>
-          <p:style>
-            <a:lnRef idx="1">
-              <a:schemeClr val="dk1"/>
-            </a:lnRef>
-            <a:fillRef idx="0">
-              <a:schemeClr val="dk1"/>
-            </a:fillRef>
-            <a:effectRef idx="0">
-              <a:schemeClr val="dk1"/>
-            </a:effectRef>
-            <a:fontRef idx="minor">
-              <a:schemeClr val="tx1"/>
-            </a:fontRef>
-          </p:style>
-        </p:cxnSp>
-        <p:cxnSp>
-          <p:nvCxnSpPr>
-            <p:cNvPr id="22" name="Straight Arrow Connector 21">
-              <a:extLst>
-                <a:ext uri="{FF2B5EF4-FFF2-40B4-BE49-F238E27FC236}">
-                  <a16:creationId xmlns:a16="http://schemas.microsoft.com/office/drawing/2014/main" id="{FB4A9BA3-D124-4C16-AC70-AA788853991A}"/>
-                </a:ext>
-              </a:extLst>
-            </p:cNvPr>
-            <p:cNvCxnSpPr>
-              <a:cxnSpLocks/>
-              <a:stCxn id="9" idx="0"/>
-            </p:cNvCxnSpPr>
-            <p:nvPr/>
-          </p:nvCxnSpPr>
-          <p:spPr>
-            <a:xfrm flipV="1">
-              <a:off x="6718414" y="2136665"/>
-              <a:ext cx="0" cy="305556"/>
-            </a:xfrm>
-            <a:prstGeom prst="straightConnector1">
-              <a:avLst/>
-            </a:prstGeom>
-            <a:ln w="38100">
-              <a:tailEnd type="triangle"/>
-            </a:ln>
-          </p:spPr>
-          <p:style>
-            <a:lnRef idx="1">
-              <a:schemeClr val="dk1"/>
-            </a:lnRef>
-            <a:fillRef idx="0">
-              <a:schemeClr val="dk1"/>
-            </a:fillRef>
-            <a:effectRef idx="0">
-              <a:schemeClr val="dk1"/>
-            </a:effectRef>
-            <a:fontRef idx="minor">
-              <a:schemeClr val="tx1"/>
-            </a:fontRef>
-          </p:style>
-        </p:cxnSp>
-        <p:sp>
-          <p:nvSpPr>
-            <p:cNvPr id="21" name="TextBox 20">
-              <a:extLst>
-                <a:ext uri="{FF2B5EF4-FFF2-40B4-BE49-F238E27FC236}">
-                  <a16:creationId xmlns:a16="http://schemas.microsoft.com/office/drawing/2014/main" id="{250FD59C-4601-48AA-ABC1-7E8950108D41}"/>
+                  <a16:creationId xmlns:a16="http://schemas.microsoft.com/office/drawing/2014/main" id="{ED079055-7C71-4281-9876-4E34D38036FF}"/>
                 </a:ext>
               </a:extLst>
             </p:cNvPr>
@@ -4054,8 +4319,8 @@
           </p:nvSpPr>
           <p:spPr>
             <a:xfrm>
-              <a:off x="5936173" y="1682126"/>
-              <a:ext cx="1743076" cy="438217"/>
+              <a:off x="9207789" y="817734"/>
+              <a:ext cx="2263202" cy="1261884"/>
             </a:xfrm>
             <a:prstGeom prst="rect">
               <a:avLst/>
@@ -4068,169 +4333,13 @@
             </a:bodyPr>
             <a:lstStyle/>
             <a:p>
+              <a:pPr algn="ctr"/>
               <a:r>
-                <a:rPr lang="en-US" sz="3211" dirty="0">
+                <a:rPr lang="en-US" sz="3800" dirty="0">
                   <a:latin typeface="Times New Roman" panose="02020603050405020304" pitchFamily="18" charset="0"/>
                   <a:cs typeface="Times New Roman" panose="02020603050405020304" pitchFamily="18" charset="0"/>
                 </a:rPr>
-                <a:t>Converged?</a:t>
-              </a:r>
-            </a:p>
-          </p:txBody>
-        </p:sp>
-        <p:sp>
-          <p:nvSpPr>
-            <p:cNvPr id="24" name="TextBox 23">
-              <a:extLst>
-                <a:ext uri="{FF2B5EF4-FFF2-40B4-BE49-F238E27FC236}">
-                  <a16:creationId xmlns:a16="http://schemas.microsoft.com/office/drawing/2014/main" id="{645D7789-AB2C-48D3-B39A-15B15007EC50}"/>
-                </a:ext>
-              </a:extLst>
-            </p:cNvPr>
-            <p:cNvSpPr txBox="1"/>
-            <p:nvPr/>
-          </p:nvSpPr>
-          <p:spPr>
-            <a:xfrm>
-              <a:off x="5176470" y="1682126"/>
-              <a:ext cx="678470" cy="438217"/>
-            </a:xfrm>
-            <a:prstGeom prst="rect">
-              <a:avLst/>
-            </a:prstGeom>
-            <a:noFill/>
-          </p:spPr>
-          <p:txBody>
-            <a:bodyPr wrap="square" rtlCol="0">
-              <a:spAutoFit/>
-            </a:bodyPr>
-            <a:lstStyle/>
-            <a:p>
-              <a:r>
-                <a:rPr lang="en-US" sz="3211" dirty="0">
-                  <a:latin typeface="Times New Roman" panose="02020603050405020304" pitchFamily="18" charset="0"/>
-                  <a:cs typeface="Times New Roman" panose="02020603050405020304" pitchFamily="18" charset="0"/>
-                </a:rPr>
-                <a:t>No</a:t>
-              </a:r>
-            </a:p>
-          </p:txBody>
-        </p:sp>
-        <p:sp>
-          <p:nvSpPr>
-            <p:cNvPr id="27" name="TextBox 26">
-              <a:extLst>
-                <a:ext uri="{FF2B5EF4-FFF2-40B4-BE49-F238E27FC236}">
-                  <a16:creationId xmlns:a16="http://schemas.microsoft.com/office/drawing/2014/main" id="{D33F5B93-D43B-443F-B595-D0D5CFC87AB1}"/>
-                </a:ext>
-              </a:extLst>
-            </p:cNvPr>
-            <p:cNvSpPr txBox="1"/>
-            <p:nvPr/>
-          </p:nvSpPr>
-          <p:spPr>
-            <a:xfrm>
-              <a:off x="7728633" y="1682126"/>
-              <a:ext cx="678470" cy="438217"/>
-            </a:xfrm>
-            <a:prstGeom prst="rect">
-              <a:avLst/>
-            </a:prstGeom>
-            <a:noFill/>
-          </p:spPr>
-          <p:txBody>
-            <a:bodyPr wrap="square" rtlCol="0">
-              <a:spAutoFit/>
-            </a:bodyPr>
-            <a:lstStyle/>
-            <a:p>
-              <a:r>
-                <a:rPr lang="en-US" sz="3211" dirty="0">
-                  <a:latin typeface="Times New Roman" panose="02020603050405020304" pitchFamily="18" charset="0"/>
-                  <a:cs typeface="Times New Roman" panose="02020603050405020304" pitchFamily="18" charset="0"/>
-                </a:rPr>
-                <a:t>Yes</a:t>
-              </a:r>
-            </a:p>
-          </p:txBody>
-        </p:sp>
-        <p:sp>
-          <p:nvSpPr>
-            <p:cNvPr id="28" name="Oval 27">
-              <a:extLst>
-                <a:ext uri="{FF2B5EF4-FFF2-40B4-BE49-F238E27FC236}">
-                  <a16:creationId xmlns:a16="http://schemas.microsoft.com/office/drawing/2014/main" id="{0A5B419D-ACE8-4AFC-8C40-B8546745FC28}"/>
-                </a:ext>
-              </a:extLst>
-            </p:cNvPr>
-            <p:cNvSpPr/>
-            <p:nvPr/>
-          </p:nvSpPr>
-          <p:spPr>
-            <a:xfrm>
-              <a:off x="8491332" y="1368825"/>
-              <a:ext cx="1554480" cy="1554480"/>
-            </a:xfrm>
-            <a:prstGeom prst="ellipse">
-              <a:avLst/>
-            </a:prstGeom>
-            <a:solidFill>
-              <a:schemeClr val="bg1"/>
-            </a:solidFill>
-            <a:ln w="38100">
-              <a:solidFill>
-                <a:srgbClr val="FF0000"/>
-              </a:solidFill>
-            </a:ln>
-          </p:spPr>
-          <p:style>
-            <a:lnRef idx="2">
-              <a:schemeClr val="accent1">
-                <a:shade val="50000"/>
-              </a:schemeClr>
-            </a:lnRef>
-            <a:fillRef idx="1">
-              <a:schemeClr val="accent1"/>
-            </a:fillRef>
-            <a:effectRef idx="0">
-              <a:schemeClr val="accent1"/>
-            </a:effectRef>
-            <a:fontRef idx="minor">
-              <a:schemeClr val="lt1"/>
-            </a:fontRef>
-          </p:style>
-          <p:txBody>
-            <a:bodyPr rot="0" spcFirstLastPara="0" vertOverflow="overflow" horzOverflow="overflow" vert="horz" wrap="square" lIns="0" tIns="0" rIns="0" bIns="0" numCol="1" spcCol="0" rtlCol="0" fromWordArt="0" anchor="ctr" anchorCtr="0" forceAA="0" compatLnSpc="1">
-              <a:prstTxWarp prst="textNoShape">
-                <a:avLst/>
-              </a:prstTxWarp>
-              <a:noAutofit/>
-            </a:bodyPr>
-            <a:lstStyle/>
-            <a:p>
-              <a:pPr algn="ctr"/>
-              <a:r>
-                <a:rPr lang="en-US" sz="4281" dirty="0">
-                  <a:solidFill>
-                    <a:sysClr val="windowText" lastClr="000000"/>
-                  </a:solidFill>
-                  <a:latin typeface="Times New Roman" panose="02020603050405020304" pitchFamily="18" charset="0"/>
-                  <a:cs typeface="Times New Roman" panose="02020603050405020304" pitchFamily="18" charset="0"/>
-                </a:rPr>
-                <a:t>FEOS</a:t>
-              </a:r>
-            </a:p>
-            <a:p>
-              <a:pPr algn="ctr"/>
-              <a:r>
-                <a:rPr lang="en-US" sz="4281" dirty="0">
-                  <a:solidFill>
-                    <a:sysClr val="windowText" lastClr="000000"/>
-                  </a:solidFill>
-                  <a:latin typeface="Times New Roman" panose="02020603050405020304" pitchFamily="18" charset="0"/>
-                  <a:cs typeface="Times New Roman" panose="02020603050405020304" pitchFamily="18" charset="0"/>
-                </a:rPr>
-                <a:t>ex-LJ</a:t>
+                <a:t>Technical accuracy</a:t>
               </a:r>
             </a:p>
           </p:txBody>

</xml_diff>

<commit_message>
Included most of Jadrans comments 2.
</commit_message>
<xml_diff>
--- a/FlowChart.pptx
+++ b/FlowChart.pptx
@@ -247,7 +247,7 @@
           <a:p>
             <a:fld id="{FC46E608-3E92-4230-87C3-1497B4266895}" type="datetimeFigureOut">
               <a:rPr lang="en-US" smtClean="0"/>
-              <a:t>7/3/2018</a:t>
+              <a:t>7/4/2018</a:t>
             </a:fld>
             <a:endParaRPr lang="en-US"/>
           </a:p>
@@ -417,7 +417,7 @@
           <a:p>
             <a:fld id="{FC46E608-3E92-4230-87C3-1497B4266895}" type="datetimeFigureOut">
               <a:rPr lang="en-US" smtClean="0"/>
-              <a:t>7/3/2018</a:t>
+              <a:t>7/4/2018</a:t>
             </a:fld>
             <a:endParaRPr lang="en-US"/>
           </a:p>
@@ -597,7 +597,7 @@
           <a:p>
             <a:fld id="{FC46E608-3E92-4230-87C3-1497B4266895}" type="datetimeFigureOut">
               <a:rPr lang="en-US" smtClean="0"/>
-              <a:t>7/3/2018</a:t>
+              <a:t>7/4/2018</a:t>
             </a:fld>
             <a:endParaRPr lang="en-US"/>
           </a:p>
@@ -767,7 +767,7 @@
           <a:p>
             <a:fld id="{FC46E608-3E92-4230-87C3-1497B4266895}" type="datetimeFigureOut">
               <a:rPr lang="en-US" smtClean="0"/>
-              <a:t>7/3/2018</a:t>
+              <a:t>7/4/2018</a:t>
             </a:fld>
             <a:endParaRPr lang="en-US"/>
           </a:p>
@@ -1013,7 +1013,7 @@
           <a:p>
             <a:fld id="{FC46E608-3E92-4230-87C3-1497B4266895}" type="datetimeFigureOut">
               <a:rPr lang="en-US" smtClean="0"/>
-              <a:t>7/3/2018</a:t>
+              <a:t>7/4/2018</a:t>
             </a:fld>
             <a:endParaRPr lang="en-US"/>
           </a:p>
@@ -1245,7 +1245,7 @@
           <a:p>
             <a:fld id="{FC46E608-3E92-4230-87C3-1497B4266895}" type="datetimeFigureOut">
               <a:rPr lang="en-US" smtClean="0"/>
-              <a:t>7/3/2018</a:t>
+              <a:t>7/4/2018</a:t>
             </a:fld>
             <a:endParaRPr lang="en-US"/>
           </a:p>
@@ -1612,7 +1612,7 @@
           <a:p>
             <a:fld id="{FC46E608-3E92-4230-87C3-1497B4266895}" type="datetimeFigureOut">
               <a:rPr lang="en-US" smtClean="0"/>
-              <a:t>7/3/2018</a:t>
+              <a:t>7/4/2018</a:t>
             </a:fld>
             <a:endParaRPr lang="en-US"/>
           </a:p>
@@ -1730,7 +1730,7 @@
           <a:p>
             <a:fld id="{FC46E608-3E92-4230-87C3-1497B4266895}" type="datetimeFigureOut">
               <a:rPr lang="en-US" smtClean="0"/>
-              <a:t>7/3/2018</a:t>
+              <a:t>7/4/2018</a:t>
             </a:fld>
             <a:endParaRPr lang="en-US"/>
           </a:p>
@@ -1825,7 +1825,7 @@
           <a:p>
             <a:fld id="{FC46E608-3E92-4230-87C3-1497B4266895}" type="datetimeFigureOut">
               <a:rPr lang="en-US" smtClean="0"/>
-              <a:t>7/3/2018</a:t>
+              <a:t>7/4/2018</a:t>
             </a:fld>
             <a:endParaRPr lang="en-US"/>
           </a:p>
@@ -2102,7 +2102,7 @@
           <a:p>
             <a:fld id="{FC46E608-3E92-4230-87C3-1497B4266895}" type="datetimeFigureOut">
               <a:rPr lang="en-US" smtClean="0"/>
-              <a:t>7/3/2018</a:t>
+              <a:t>7/4/2018</a:t>
             </a:fld>
             <a:endParaRPr lang="en-US"/>
           </a:p>
@@ -2359,7 +2359,7 @@
           <a:p>
             <a:fld id="{FC46E608-3E92-4230-87C3-1497B4266895}" type="datetimeFigureOut">
               <a:rPr lang="en-US" smtClean="0"/>
-              <a:t>7/3/2018</a:t>
+              <a:t>7/4/2018</a:t>
             </a:fld>
             <a:endParaRPr lang="en-US"/>
           </a:p>
@@ -2572,7 +2572,7 @@
           <a:p>
             <a:fld id="{FC46E608-3E92-4230-87C3-1497B4266895}" type="datetimeFigureOut">
               <a:rPr lang="en-US" smtClean="0"/>
-              <a:t>7/3/2018</a:t>
+              <a:t>7/4/2018</a:t>
             </a:fld>
             <a:endParaRPr lang="en-US"/>
           </a:p>
@@ -3148,7 +3148,17 @@
                     <a:latin typeface="Times New Roman" panose="02020603050405020304" pitchFamily="18" charset="0"/>
                     <a:cs typeface="Times New Roman" panose="02020603050405020304" pitchFamily="18" charset="0"/>
                   </a:rPr>
-                  <a:t>ms2</a:t>
+                  <a:t>ms</a:t>
+                </a:r>
+                <a:r>
+                  <a:rPr lang="en-US" sz="4281" dirty="0">
+                    <a:solidFill>
+                      <a:sysClr val="windowText" lastClr="000000"/>
+                    </a:solidFill>
+                    <a:latin typeface="Times New Roman" panose="02020603050405020304" pitchFamily="18" charset="0"/>
+                    <a:cs typeface="Times New Roman" panose="02020603050405020304" pitchFamily="18" charset="0"/>
+                  </a:rPr>
+                  <a:t>2</a:t>
                 </a:r>
               </a:p>
             </p:txBody>
@@ -3303,7 +3313,7 @@
             </p:nvSpPr>
             <p:spPr>
               <a:xfrm>
-                <a:off x="6174152" y="2435787"/>
+                <a:off x="6159327" y="2556703"/>
                 <a:ext cx="1554480" cy="1554480"/>
               </a:xfrm>
               <a:prstGeom prst="ellipse">
@@ -3381,8 +3391,8 @@
               <a:prstGeom prst="straightConnector1">
                 <a:avLst/>
               </a:prstGeom>
-              <a:ln w="38100">
-                <a:tailEnd type="triangle"/>
+              <a:ln w="63500">
+                <a:tailEnd type="triangle" w="med" len="lg"/>
               </a:ln>
             </p:spPr>
             <p:style>
@@ -3424,8 +3434,9 @@
               <a:prstGeom prst="straightConnector1">
                 <a:avLst/>
               </a:prstGeom>
-              <a:ln w="38100">
-                <a:tailEnd type="triangle"/>
+              <a:ln w="63500">
+                <a:headEnd w="lg" len="sm"/>
+                <a:tailEnd type="triangle" w="med" len="lg"/>
               </a:ln>
             </p:spPr>
             <p:style>
@@ -3467,8 +3478,8 @@
               <a:prstGeom prst="straightConnector1">
                 <a:avLst/>
               </a:prstGeom>
-              <a:ln w="38100">
-                <a:tailEnd type="triangle"/>
+              <a:ln w="63500">
+                <a:tailEnd type="triangle" w="med" len="lg"/>
               </a:ln>
             </p:spPr>
             <p:style>
@@ -3503,15 +3514,15 @@
               <p:nvPr/>
             </p:nvCxnSpPr>
             <p:spPr>
-              <a:xfrm flipV="1">
-                <a:off x="6940441" y="3990267"/>
-                <a:ext cx="10951" cy="856719"/>
+              <a:xfrm flipH="1" flipV="1">
+                <a:off x="6936567" y="4111183"/>
+                <a:ext cx="3874" cy="735803"/>
               </a:xfrm>
               <a:prstGeom prst="straightConnector1">
                 <a:avLst/>
               </a:prstGeom>
-              <a:ln w="38100">
-                <a:tailEnd type="triangle"/>
+              <a:ln w="63500">
+                <a:tailEnd type="triangle" w="med" len="lg"/>
               </a:ln>
             </p:spPr>
             <p:style>
@@ -3552,8 +3563,8 @@
               <a:prstGeom prst="straightConnector1">
                 <a:avLst/>
               </a:prstGeom>
-              <a:ln w="38100">
-                <a:tailEnd type="triangle"/>
+              <a:ln w="63500">
+                <a:tailEnd type="triangle" w="med" len="lg"/>
               </a:ln>
             </p:spPr>
             <p:style>
@@ -3571,8 +3582,8 @@
               </a:fontRef>
             </p:style>
           </p:cxnSp>
-          <mc:AlternateContent xmlns:mc="http://schemas.openxmlformats.org/markup-compatibility/2006">
-            <mc:Choice xmlns:a14="http://schemas.microsoft.com/office/drawing/2010/main" Requires="a14">
+          <mc:AlternateContent xmlns:mc="http://schemas.openxmlformats.org/markup-compatibility/2006" xmlns:a14="http://schemas.microsoft.com/office/drawing/2010/main">
+            <mc:Choice Requires="a14">
               <p:sp>
                 <p:nvSpPr>
                   <p:cNvPr id="2" name="TextBox 1">
@@ -3651,7 +3662,7 @@
                 </p:txBody>
               </p:sp>
             </mc:Choice>
-            <mc:Fallback>
+            <mc:Fallback xmlns="">
               <p:sp>
                 <p:nvSpPr>
                   <p:cNvPr id="2" name="TextBox 1">
@@ -3696,8 +3707,8 @@
               </p:sp>
             </mc:Fallback>
           </mc:AlternateContent>
-          <mc:AlternateContent xmlns:mc="http://schemas.openxmlformats.org/markup-compatibility/2006">
-            <mc:Choice xmlns:a14="http://schemas.microsoft.com/office/drawing/2010/main" Requires="a14">
+          <mc:AlternateContent xmlns:mc="http://schemas.openxmlformats.org/markup-compatibility/2006" xmlns:a14="http://schemas.microsoft.com/office/drawing/2010/main">
+            <mc:Choice Requires="a14">
               <p:sp>
                 <p:nvSpPr>
                   <p:cNvPr id="7" name="TextBox 6">
@@ -3821,7 +3832,7 @@
                 </p:txBody>
               </p:sp>
             </mc:Choice>
-            <mc:Fallback>
+            <mc:Fallback xmlns="">
               <p:sp>
                 <p:nvSpPr>
                   <p:cNvPr id="7" name="TextBox 6">
@@ -3882,7 +3893,7 @@
                 </p:nvSpPr>
                 <p:spPr>
                   <a:xfrm>
-                    <a:off x="7076516" y="4007864"/>
+                    <a:off x="7082487" y="4060141"/>
                     <a:ext cx="1787951" cy="836522"/>
                   </a:xfrm>
                   <a:prstGeom prst="rect">
@@ -3905,7 +3916,6 @@
                     </a:r>
                   </a:p>
                   <a:p>
-                    <a:pPr/>
                     <a14:m>
                       <m:oMath xmlns:m="http://schemas.openxmlformats.org/officeDocument/2006/math">
                         <m:sSub>
@@ -4013,7 +4023,7 @@
                 </p:nvSpPr>
                 <p:spPr>
                   <a:xfrm>
-                    <a:off x="7076516" y="4007864"/>
+                    <a:off x="7082487" y="4060141"/>
                     <a:ext cx="1787951" cy="836522"/>
                   </a:xfrm>
                   <a:prstGeom prst="rect">
@@ -4022,7 +4032,7 @@
                   <a:blipFill>
                     <a:blip r:embed="rId4"/>
                     <a:stretch>
-                      <a:fillRect l="-6361" t="-7065" b="-12500"/>
+                      <a:fillRect l="-6633" t="-7104" b="-13115"/>
                     </a:stretch>
                   </a:blipFill>
                 </p:spPr>
@@ -4064,8 +4074,8 @@
               <a:prstGeom prst="straightConnector1">
                 <a:avLst/>
               </a:prstGeom>
-              <a:ln w="38100">
-                <a:tailEnd type="triangle"/>
+              <a:ln w="63500">
+                <a:tailEnd type="triangle" w="med" len="lg"/>
               </a:ln>
             </p:spPr>
             <p:style>
@@ -4099,15 +4109,15 @@
               <p:nvPr/>
             </p:nvCxnSpPr>
             <p:spPr>
-              <a:xfrm flipV="1">
-                <a:off x="6951392" y="2130231"/>
-                <a:ext cx="0" cy="305556"/>
+              <a:xfrm flipH="1" flipV="1">
+                <a:off x="6934035" y="2146065"/>
+                <a:ext cx="2532" cy="410638"/>
               </a:xfrm>
               <a:prstGeom prst="straightConnector1">
                 <a:avLst/>
               </a:prstGeom>
-              <a:ln w="38100">
-                <a:tailEnd type="triangle"/>
+              <a:ln w="63500">
+                <a:tailEnd type="triangle" w="med" len="lg"/>
               </a:ln>
             </p:spPr>
             <p:style>
@@ -4139,7 +4149,7 @@
             </p:nvSpPr>
             <p:spPr>
               <a:xfrm>
-                <a:off x="5892191" y="1687856"/>
+                <a:off x="5870231" y="1709045"/>
                 <a:ext cx="2127610" cy="438217"/>
               </a:xfrm>
               <a:prstGeom prst="rect">
@@ -4177,7 +4187,7 @@
             </p:nvSpPr>
             <p:spPr>
               <a:xfrm>
-                <a:off x="5058748" y="1687856"/>
+                <a:off x="4997461" y="1709044"/>
                 <a:ext cx="678470" cy="438217"/>
               </a:xfrm>
               <a:prstGeom prst="rect">
@@ -4215,7 +4225,7 @@
             </p:nvSpPr>
             <p:spPr>
               <a:xfrm>
-                <a:off x="8014948" y="1679526"/>
+                <a:off x="8065753" y="1706652"/>
                 <a:ext cx="678470" cy="438217"/>
               </a:xfrm>
               <a:prstGeom prst="rect">

</xml_diff>